<commit_message>
Methodology intro and data harmonisation
</commit_message>
<xml_diff>
--- a/figures/ch4/modelDevVal.pptx
+++ b/figures/ch4/modelDevVal.pptx
@@ -104,6 +104,11 @@
       </a:defRPr>
     </a:lvl9pPr>
   </p:defaultTextStyle>
+  <p:extLst>
+    <p:ext uri="{EFAFB233-063F-42B5-8137-9DF3F51BA10A}">
+      <p15:sldGuideLst xmlns:p15="http://schemas.microsoft.com/office/powerpoint/2012/main"/>
+    </p:ext>
+  </p:extLst>
 </p:presentation>
 </file>
 
@@ -256,7 +261,7 @@
           <a:p>
             <a:fld id="{6135D599-5AE2-C34B-AA91-CF23DFEDEA40}" type="datetimeFigureOut">
               <a:rPr lang="en-US" smtClean="0"/>
-              <a:t>12/13/25</a:t>
+              <a:t>12/15/25</a:t>
             </a:fld>
             <a:endParaRPr lang="en-US"/>
           </a:p>
@@ -456,7 +461,7 @@
           <a:p>
             <a:fld id="{6135D599-5AE2-C34B-AA91-CF23DFEDEA40}" type="datetimeFigureOut">
               <a:rPr lang="en-US" smtClean="0"/>
-              <a:t>12/13/25</a:t>
+              <a:t>12/15/25</a:t>
             </a:fld>
             <a:endParaRPr lang="en-US"/>
           </a:p>
@@ -666,7 +671,7 @@
           <a:p>
             <a:fld id="{6135D599-5AE2-C34B-AA91-CF23DFEDEA40}" type="datetimeFigureOut">
               <a:rPr lang="en-US" smtClean="0"/>
-              <a:t>12/13/25</a:t>
+              <a:t>12/15/25</a:t>
             </a:fld>
             <a:endParaRPr lang="en-US"/>
           </a:p>
@@ -866,7 +871,7 @@
           <a:p>
             <a:fld id="{6135D599-5AE2-C34B-AA91-CF23DFEDEA40}" type="datetimeFigureOut">
               <a:rPr lang="en-US" smtClean="0"/>
-              <a:t>12/13/25</a:t>
+              <a:t>12/15/25</a:t>
             </a:fld>
             <a:endParaRPr lang="en-US"/>
           </a:p>
@@ -1142,7 +1147,7 @@
           <a:p>
             <a:fld id="{6135D599-5AE2-C34B-AA91-CF23DFEDEA40}" type="datetimeFigureOut">
               <a:rPr lang="en-US" smtClean="0"/>
-              <a:t>12/13/25</a:t>
+              <a:t>12/15/25</a:t>
             </a:fld>
             <a:endParaRPr lang="en-US"/>
           </a:p>
@@ -1410,7 +1415,7 @@
           <a:p>
             <a:fld id="{6135D599-5AE2-C34B-AA91-CF23DFEDEA40}" type="datetimeFigureOut">
               <a:rPr lang="en-US" smtClean="0"/>
-              <a:t>12/13/25</a:t>
+              <a:t>12/15/25</a:t>
             </a:fld>
             <a:endParaRPr lang="en-US"/>
           </a:p>
@@ -1825,7 +1830,7 @@
           <a:p>
             <a:fld id="{6135D599-5AE2-C34B-AA91-CF23DFEDEA40}" type="datetimeFigureOut">
               <a:rPr lang="en-US" smtClean="0"/>
-              <a:t>12/13/25</a:t>
+              <a:t>12/15/25</a:t>
             </a:fld>
             <a:endParaRPr lang="en-US"/>
           </a:p>
@@ -1967,7 +1972,7 @@
           <a:p>
             <a:fld id="{6135D599-5AE2-C34B-AA91-CF23DFEDEA40}" type="datetimeFigureOut">
               <a:rPr lang="en-US" smtClean="0"/>
-              <a:t>12/13/25</a:t>
+              <a:t>12/15/25</a:t>
             </a:fld>
             <a:endParaRPr lang="en-US"/>
           </a:p>
@@ -2080,7 +2085,7 @@
           <a:p>
             <a:fld id="{6135D599-5AE2-C34B-AA91-CF23DFEDEA40}" type="datetimeFigureOut">
               <a:rPr lang="en-US" smtClean="0"/>
-              <a:t>12/13/25</a:t>
+              <a:t>12/15/25</a:t>
             </a:fld>
             <a:endParaRPr lang="en-US"/>
           </a:p>
@@ -2393,7 +2398,7 @@
           <a:p>
             <a:fld id="{6135D599-5AE2-C34B-AA91-CF23DFEDEA40}" type="datetimeFigureOut">
               <a:rPr lang="en-US" smtClean="0"/>
-              <a:t>12/13/25</a:t>
+              <a:t>12/15/25</a:t>
             </a:fld>
             <a:endParaRPr lang="en-US"/>
           </a:p>
@@ -2682,7 +2687,7 @@
           <a:p>
             <a:fld id="{6135D599-5AE2-C34B-AA91-CF23DFEDEA40}" type="datetimeFigureOut">
               <a:rPr lang="en-US" smtClean="0"/>
-              <a:t>12/13/25</a:t>
+              <a:t>12/15/25</a:t>
             </a:fld>
             <a:endParaRPr lang="en-US"/>
           </a:p>
@@ -2925,7 +2930,7 @@
           <a:p>
             <a:fld id="{6135D599-5AE2-C34B-AA91-CF23DFEDEA40}" type="datetimeFigureOut">
               <a:rPr lang="en-US" smtClean="0"/>
-              <a:t>12/13/25</a:t>
+              <a:t>12/15/25</a:t>
             </a:fld>
             <a:endParaRPr lang="en-US"/>
           </a:p>
@@ -3366,82 +3371,86 @@
               <a:gd name="csY0" fmla="*/ 0 h 7120475"/>
               <a:gd name="csX1" fmla="*/ 638476 w 5720722"/>
               <a:gd name="csY1" fmla="*/ 0 h 7120475"/>
-              <a:gd name="csX2" fmla="*/ 1251412 w 5720722"/>
+              <a:gd name="csX2" fmla="*/ 1225873 w 5720722"/>
               <a:gd name="csY2" fmla="*/ 0 h 7120475"/>
-              <a:gd name="csX3" fmla="*/ 1889887 w 5720722"/>
+              <a:gd name="csX3" fmla="*/ 1838809 w 5720722"/>
               <a:gd name="csY3" fmla="*/ 0 h 7120475"/>
               <a:gd name="csX4" fmla="*/ 2553902 w 5720722"/>
               <a:gd name="csY4" fmla="*/ 0 h 7120475"/>
               <a:gd name="csX5" fmla="*/ 2553902 w 5720722"/>
-              <a:gd name="csY5" fmla="*/ 757276 h 7120475"/>
+              <a:gd name="csY5" fmla="*/ 619590 h 7120475"/>
               <a:gd name="csX6" fmla="*/ 2553902 w 5720722"/>
-              <a:gd name="csY6" fmla="*/ 1342444 h 7120475"/>
+              <a:gd name="csY6" fmla="*/ 1273601 h 7120475"/>
               <a:gd name="csX7" fmla="*/ 2553902 w 5720722"/>
-              <a:gd name="csY7" fmla="*/ 2065299 h 7120475"/>
+              <a:gd name="csY7" fmla="*/ 1858769 h 7120475"/>
               <a:gd name="csX8" fmla="*/ 2553902 w 5720722"/>
-              <a:gd name="csY8" fmla="*/ 2684889 h 7120475"/>
+              <a:gd name="csY8" fmla="*/ 2478359 h 7120475"/>
               <a:gd name="csX9" fmla="*/ 2553902 w 5720722"/>
               <a:gd name="csY9" fmla="*/ 3442165 h 7120475"/>
               <a:gd name="csX10" fmla="*/ 3187266 w 5720722"/>
               <a:gd name="csY10" fmla="*/ 3442165 h 7120475"/>
               <a:gd name="csX11" fmla="*/ 3788962 w 5720722"/>
               <a:gd name="csY11" fmla="*/ 3442165 h 7120475"/>
-              <a:gd name="csX12" fmla="*/ 4485662 w 5720722"/>
+              <a:gd name="csX12" fmla="*/ 4358989 w 5720722"/>
               <a:gd name="csY12" fmla="*/ 3442165 h 7120475"/>
-              <a:gd name="csX13" fmla="*/ 5055690 w 5720722"/>
+              <a:gd name="csX13" fmla="*/ 4992353 w 5720722"/>
               <a:gd name="csY13" fmla="*/ 3442165 h 7120475"/>
               <a:gd name="csX14" fmla="*/ 5720722 w 5720722"/>
               <a:gd name="csY14" fmla="*/ 3442165 h 7120475"/>
               <a:gd name="csX15" fmla="*/ 5720722 w 5720722"/>
-              <a:gd name="csY15" fmla="*/ 4055217 h 7120475"/>
+              <a:gd name="csY15" fmla="*/ 4092000 h 7120475"/>
               <a:gd name="csX16" fmla="*/ 5720722 w 5720722"/>
-              <a:gd name="csY16" fmla="*/ 4594702 h 7120475"/>
+              <a:gd name="csY16" fmla="*/ 4705051 h 7120475"/>
               <a:gd name="csX17" fmla="*/ 5720722 w 5720722"/>
-              <a:gd name="csY17" fmla="*/ 5134188 h 7120475"/>
+              <a:gd name="csY17" fmla="*/ 5244537 h 7120475"/>
               <a:gd name="csX18" fmla="*/ 5720722 w 5720722"/>
-              <a:gd name="csY18" fmla="*/ 5784022 h 7120475"/>
+              <a:gd name="csY18" fmla="*/ 5894372 h 7120475"/>
               <a:gd name="csX19" fmla="*/ 5720722 w 5720722"/>
-              <a:gd name="csY19" fmla="*/ 6433857 h 7120475"/>
+              <a:gd name="csY19" fmla="*/ 6544206 h 7120475"/>
               <a:gd name="csX20" fmla="*/ 5720722 w 5720722"/>
               <a:gd name="csY20" fmla="*/ 7120475 h 7120475"/>
-              <a:gd name="csX21" fmla="*/ 4970672 w 5720722"/>
+              <a:gd name="csX21" fmla="*/ 5256708 w 5720722"/>
               <a:gd name="csY21" fmla="*/ 7120475 h 7120475"/>
-              <a:gd name="csX22" fmla="*/ 4335036 w 5720722"/>
+              <a:gd name="csX22" fmla="*/ 4735487 w 5720722"/>
               <a:gd name="csY22" fmla="*/ 7120475 h 7120475"/>
-              <a:gd name="csX23" fmla="*/ 3813815 w 5720722"/>
+              <a:gd name="csX23" fmla="*/ 4214265 w 5720722"/>
               <a:gd name="csY23" fmla="*/ 7120475 h 7120475"/>
-              <a:gd name="csX24" fmla="*/ 3235386 w 5720722"/>
+              <a:gd name="csX24" fmla="*/ 3635837 w 5720722"/>
               <a:gd name="csY24" fmla="*/ 7120475 h 7120475"/>
-              <a:gd name="csX25" fmla="*/ 2485336 w 5720722"/>
+              <a:gd name="csX25" fmla="*/ 3000201 w 5720722"/>
               <a:gd name="csY25" fmla="*/ 7120475 h 7120475"/>
-              <a:gd name="csX26" fmla="*/ 1906907 w 5720722"/>
+              <a:gd name="csX26" fmla="*/ 2536187 w 5720722"/>
               <a:gd name="csY26" fmla="*/ 7120475 h 7120475"/>
-              <a:gd name="csX27" fmla="*/ 1442893 w 5720722"/>
+              <a:gd name="csX27" fmla="*/ 1957758 w 5720722"/>
               <a:gd name="csY27" fmla="*/ 7120475 h 7120475"/>
-              <a:gd name="csX28" fmla="*/ 921672 w 5720722"/>
+              <a:gd name="csX28" fmla="*/ 1493744 w 5720722"/>
               <a:gd name="csY28" fmla="*/ 7120475 h 7120475"/>
-              <a:gd name="csX29" fmla="*/ 0 w 5720722"/>
+              <a:gd name="csX29" fmla="*/ 858108 w 5720722"/>
               <a:gd name="csY29" fmla="*/ 7120475 h 7120475"/>
               <a:gd name="csX30" fmla="*/ 0 w 5720722"/>
-              <a:gd name="csY30" fmla="*/ 6544364 h 7120475"/>
+              <a:gd name="csY30" fmla="*/ 7120475 h 7120475"/>
               <a:gd name="csX31" fmla="*/ 0 w 5720722"/>
-              <a:gd name="csY31" fmla="*/ 5754638 h 7120475"/>
+              <a:gd name="csY31" fmla="*/ 6401954 h 7120475"/>
               <a:gd name="csX32" fmla="*/ 0 w 5720722"/>
-              <a:gd name="csY32" fmla="*/ 4964913 h 7120475"/>
+              <a:gd name="csY32" fmla="*/ 5683434 h 7120475"/>
               <a:gd name="csX33" fmla="*/ 0 w 5720722"/>
-              <a:gd name="csY33" fmla="*/ 4531211 h 7120475"/>
+              <a:gd name="csY33" fmla="*/ 4964913 h 7120475"/>
               <a:gd name="csX34" fmla="*/ 0 w 5720722"/>
-              <a:gd name="csY34" fmla="*/ 3741486 h 7120475"/>
+              <a:gd name="csY34" fmla="*/ 4531211 h 7120475"/>
               <a:gd name="csX35" fmla="*/ 0 w 5720722"/>
-              <a:gd name="csY35" fmla="*/ 3094170 h 7120475"/>
+              <a:gd name="csY35" fmla="*/ 3955100 h 7120475"/>
               <a:gd name="csX36" fmla="*/ 0 w 5720722"/>
-              <a:gd name="csY36" fmla="*/ 2304445 h 7120475"/>
+              <a:gd name="csY36" fmla="*/ 3165375 h 7120475"/>
               <a:gd name="csX37" fmla="*/ 0 w 5720722"/>
-              <a:gd name="csY37" fmla="*/ 1585924 h 7120475"/>
+              <a:gd name="csY37" fmla="*/ 2589264 h 7120475"/>
               <a:gd name="csX38" fmla="*/ 0 w 5720722"/>
-              <a:gd name="csY38" fmla="*/ 1009813 h 7120475"/>
+              <a:gd name="csY38" fmla="*/ 2155562 h 7120475"/>
               <a:gd name="csX39" fmla="*/ 0 w 5720722"/>
-              <a:gd name="csY39" fmla="*/ 0 h 7120475"/>
+              <a:gd name="csY39" fmla="*/ 1579451 h 7120475"/>
+              <a:gd name="csX40" fmla="*/ 0 w 5720722"/>
+              <a:gd name="csY40" fmla="*/ 789725 h 7120475"/>
+              <a:gd name="csX41" fmla="*/ 0 w 5720722"/>
+              <a:gd name="csY41" fmla="*/ 0 h 7120475"/>
             </a:gdLst>
             <a:ahLst/>
             <a:cxnLst>
@@ -3565,10 +3574,227 @@
               <a:cxn ang="0">
                 <a:pos x="csX39" y="csY39"/>
               </a:cxn>
+              <a:cxn ang="0">
+                <a:pos x="csX40" y="csY40"/>
+              </a:cxn>
+              <a:cxn ang="0">
+                <a:pos x="csX41" y="csY41"/>
+              </a:cxn>
             </a:cxnLst>
             <a:rect l="l" t="t" r="r" b="b"/>
             <a:pathLst>
-              <a:path w="5720722" h="7120475" extrusionOk="0">
+              <a:path w="5720722" h="7120475" fill="none" extrusionOk="0">
+                <a:moveTo>
+                  <a:pt x="0" y="0"/>
+                </a:moveTo>
+                <a:cubicBezTo>
+                  <a:pt x="293873" y="-7567"/>
+                  <a:pt x="482595" y="2615"/>
+                  <a:pt x="638476" y="0"/>
+                </a:cubicBezTo>
+                <a:cubicBezTo>
+                  <a:pt x="794357" y="-2615"/>
+                  <a:pt x="1086747" y="-25766"/>
+                  <a:pt x="1225873" y="0"/>
+                </a:cubicBezTo>
+                <a:cubicBezTo>
+                  <a:pt x="1364999" y="25766"/>
+                  <a:pt x="1658514" y="-11816"/>
+                  <a:pt x="1838809" y="0"/>
+                </a:cubicBezTo>
+                <a:cubicBezTo>
+                  <a:pt x="2019104" y="11816"/>
+                  <a:pt x="2361043" y="-14627"/>
+                  <a:pt x="2553902" y="0"/>
+                </a:cubicBezTo>
+                <a:cubicBezTo>
+                  <a:pt x="2524637" y="193270"/>
+                  <a:pt x="2533485" y="442383"/>
+                  <a:pt x="2553902" y="619590"/>
+                </a:cubicBezTo>
+                <a:cubicBezTo>
+                  <a:pt x="2574320" y="796797"/>
+                  <a:pt x="2526891" y="1071329"/>
+                  <a:pt x="2553902" y="1273601"/>
+                </a:cubicBezTo>
+                <a:cubicBezTo>
+                  <a:pt x="2580913" y="1475873"/>
+                  <a:pt x="2525041" y="1615583"/>
+                  <a:pt x="2553902" y="1858769"/>
+                </a:cubicBezTo>
+                <a:cubicBezTo>
+                  <a:pt x="2582763" y="2101955"/>
+                  <a:pt x="2555709" y="2325135"/>
+                  <a:pt x="2553902" y="2478359"/>
+                </a:cubicBezTo>
+                <a:cubicBezTo>
+                  <a:pt x="2552096" y="2631583"/>
+                  <a:pt x="2571842" y="3195542"/>
+                  <a:pt x="2553902" y="3442165"/>
+                </a:cubicBezTo>
+                <a:cubicBezTo>
+                  <a:pt x="2798654" y="3468745"/>
+                  <a:pt x="2937476" y="3440383"/>
+                  <a:pt x="3187266" y="3442165"/>
+                </a:cubicBezTo>
+                <a:cubicBezTo>
+                  <a:pt x="3437056" y="3443947"/>
+                  <a:pt x="3521380" y="3463940"/>
+                  <a:pt x="3788962" y="3442165"/>
+                </a:cubicBezTo>
+                <a:cubicBezTo>
+                  <a:pt x="4056544" y="3420390"/>
+                  <a:pt x="4217667" y="3442295"/>
+                  <a:pt x="4358989" y="3442165"/>
+                </a:cubicBezTo>
+                <a:cubicBezTo>
+                  <a:pt x="4500311" y="3442035"/>
+                  <a:pt x="4834460" y="3441480"/>
+                  <a:pt x="4992353" y="3442165"/>
+                </a:cubicBezTo>
+                <a:cubicBezTo>
+                  <a:pt x="5150246" y="3442850"/>
+                  <a:pt x="5498073" y="3431646"/>
+                  <a:pt x="5720722" y="3442165"/>
+                </a:cubicBezTo>
+                <a:cubicBezTo>
+                  <a:pt x="5697659" y="3674036"/>
+                  <a:pt x="5752236" y="3796206"/>
+                  <a:pt x="5720722" y="4092000"/>
+                </a:cubicBezTo>
+                <a:cubicBezTo>
+                  <a:pt x="5689208" y="4387794"/>
+                  <a:pt x="5736215" y="4570127"/>
+                  <a:pt x="5720722" y="4705051"/>
+                </a:cubicBezTo>
+                <a:cubicBezTo>
+                  <a:pt x="5705229" y="4839975"/>
+                  <a:pt x="5745774" y="5101268"/>
+                  <a:pt x="5720722" y="5244537"/>
+                </a:cubicBezTo>
+                <a:cubicBezTo>
+                  <a:pt x="5695670" y="5387806"/>
+                  <a:pt x="5714918" y="5627350"/>
+                  <a:pt x="5720722" y="5894372"/>
+                </a:cubicBezTo>
+                <a:cubicBezTo>
+                  <a:pt x="5726526" y="6161394"/>
+                  <a:pt x="5744153" y="6412641"/>
+                  <a:pt x="5720722" y="6544206"/>
+                </a:cubicBezTo>
+                <a:cubicBezTo>
+                  <a:pt x="5697291" y="6675771"/>
+                  <a:pt x="5720697" y="6944540"/>
+                  <a:pt x="5720722" y="7120475"/>
+                </a:cubicBezTo>
+                <a:cubicBezTo>
+                  <a:pt x="5494333" y="7126749"/>
+                  <a:pt x="5469124" y="7113768"/>
+                  <a:pt x="5256708" y="7120475"/>
+                </a:cubicBezTo>
+                <a:cubicBezTo>
+                  <a:pt x="5044292" y="7127182"/>
+                  <a:pt x="4970484" y="7111403"/>
+                  <a:pt x="4735487" y="7120475"/>
+                </a:cubicBezTo>
+                <a:cubicBezTo>
+                  <a:pt x="4500490" y="7129547"/>
+                  <a:pt x="4429763" y="7103747"/>
+                  <a:pt x="4214265" y="7120475"/>
+                </a:cubicBezTo>
+                <a:cubicBezTo>
+                  <a:pt x="3998767" y="7137203"/>
+                  <a:pt x="3847992" y="7142933"/>
+                  <a:pt x="3635837" y="7120475"/>
+                </a:cubicBezTo>
+                <a:cubicBezTo>
+                  <a:pt x="3423682" y="7098017"/>
+                  <a:pt x="3213499" y="7092398"/>
+                  <a:pt x="3000201" y="7120475"/>
+                </a:cubicBezTo>
+                <a:cubicBezTo>
+                  <a:pt x="2786903" y="7148552"/>
+                  <a:pt x="2647593" y="7119956"/>
+                  <a:pt x="2536187" y="7120475"/>
+                </a:cubicBezTo>
+                <a:cubicBezTo>
+                  <a:pt x="2424781" y="7120994"/>
+                  <a:pt x="2087834" y="7134049"/>
+                  <a:pt x="1957758" y="7120475"/>
+                </a:cubicBezTo>
+                <a:cubicBezTo>
+                  <a:pt x="1827682" y="7106901"/>
+                  <a:pt x="1626012" y="7125072"/>
+                  <a:pt x="1493744" y="7120475"/>
+                </a:cubicBezTo>
+                <a:cubicBezTo>
+                  <a:pt x="1361476" y="7115878"/>
+                  <a:pt x="1118135" y="7098613"/>
+                  <a:pt x="858108" y="7120475"/>
+                </a:cubicBezTo>
+                <a:cubicBezTo>
+                  <a:pt x="598081" y="7142337"/>
+                  <a:pt x="406795" y="7077913"/>
+                  <a:pt x="0" y="7120475"/>
+                </a:cubicBezTo>
+                <a:cubicBezTo>
+                  <a:pt x="-14518" y="6867591"/>
+                  <a:pt x="26843" y="6562548"/>
+                  <a:pt x="0" y="6401954"/>
+                </a:cubicBezTo>
+                <a:cubicBezTo>
+                  <a:pt x="-26843" y="6241360"/>
+                  <a:pt x="28696" y="6031329"/>
+                  <a:pt x="0" y="5683434"/>
+                </a:cubicBezTo>
+                <a:cubicBezTo>
+                  <a:pt x="-28696" y="5335539"/>
+                  <a:pt x="-10231" y="5179623"/>
+                  <a:pt x="0" y="4964913"/>
+                </a:cubicBezTo>
+                <a:cubicBezTo>
+                  <a:pt x="10231" y="4750203"/>
+                  <a:pt x="-9212" y="4715850"/>
+                  <a:pt x="0" y="4531211"/>
+                </a:cubicBezTo>
+                <a:cubicBezTo>
+                  <a:pt x="9212" y="4346572"/>
+                  <a:pt x="-7860" y="4091089"/>
+                  <a:pt x="0" y="3955100"/>
+                </a:cubicBezTo>
+                <a:cubicBezTo>
+                  <a:pt x="7860" y="3819111"/>
+                  <a:pt x="-2812" y="3469196"/>
+                  <a:pt x="0" y="3165375"/>
+                </a:cubicBezTo>
+                <a:cubicBezTo>
+                  <a:pt x="2812" y="2861555"/>
+                  <a:pt x="-18947" y="2773583"/>
+                  <a:pt x="0" y="2589264"/>
+                </a:cubicBezTo>
+                <a:cubicBezTo>
+                  <a:pt x="18947" y="2404945"/>
+                  <a:pt x="-16921" y="2350577"/>
+                  <a:pt x="0" y="2155562"/>
+                </a:cubicBezTo>
+                <a:cubicBezTo>
+                  <a:pt x="16921" y="1960547"/>
+                  <a:pt x="-19296" y="1731482"/>
+                  <a:pt x="0" y="1579451"/>
+                </a:cubicBezTo>
+                <a:cubicBezTo>
+                  <a:pt x="19296" y="1427420"/>
+                  <a:pt x="11005" y="1045902"/>
+                  <a:pt x="0" y="789725"/>
+                </a:cubicBezTo>
+                <a:cubicBezTo>
+                  <a:pt x="-11005" y="533548"/>
+                  <a:pt x="35649" y="185753"/>
+                  <a:pt x="0" y="0"/>
+                </a:cubicBezTo>
+                <a:close/>
+              </a:path>
+              <a:path w="5720722" h="7120475" stroke="0" extrusionOk="0">
                 <a:moveTo>
                   <a:pt x="0" y="0"/>
                 </a:moveTo>
@@ -3814,7 +4040,7 @@
           <a:lstStyle/>
           <a:p>
             <a:pPr algn="ctr"/>
-            <a:endParaRPr lang="en-US"/>
+            <a:endParaRPr lang="en-US" sz="1150"/>
           </a:p>
         </p:txBody>
       </p:sp>
@@ -3842,13 +4068,13 @@
               <a:gd name="csY0" fmla="*/ 113578 h 3045798"/>
               <a:gd name="csX1" fmla="*/ 113578 w 3089682"/>
               <a:gd name="csY1" fmla="*/ 0 h 3045798"/>
-              <a:gd name="csX2" fmla="*/ 743334 w 3089682"/>
+              <a:gd name="csX2" fmla="*/ 714708 w 3089682"/>
               <a:gd name="csY2" fmla="*/ 0 h 3045798"/>
-              <a:gd name="csX3" fmla="*/ 1287214 w 3089682"/>
+              <a:gd name="csX3" fmla="*/ 1229963 w 3089682"/>
               <a:gd name="csY3" fmla="*/ 0 h 3045798"/>
-              <a:gd name="csX4" fmla="*/ 1802468 w 3089682"/>
+              <a:gd name="csX4" fmla="*/ 1831094 w 3089682"/>
               <a:gd name="csY4" fmla="*/ 0 h 3045798"/>
-              <a:gd name="csX5" fmla="*/ 2403599 w 3089682"/>
+              <a:gd name="csX5" fmla="*/ 2317723 w 3089682"/>
               <a:gd name="csY5" fmla="*/ 0 h 3045798"/>
               <a:gd name="csX6" fmla="*/ 2976104 w 3089682"/>
               <a:gd name="csY6" fmla="*/ 0 h 3045798"/>
@@ -3857,35 +4083,35 @@
               <a:gd name="csX8" fmla="*/ 3089682 w 3089682"/>
               <a:gd name="csY8" fmla="*/ 677306 h 3045798"/>
               <a:gd name="csX9" fmla="*/ 3089682 w 3089682"/>
-              <a:gd name="csY9" fmla="*/ 1156476 h 3045798"/>
+              <a:gd name="csY9" fmla="*/ 1269221 h 3045798"/>
               <a:gd name="csX10" fmla="*/ 3089682 w 3089682"/>
-              <a:gd name="csY10" fmla="*/ 1720204 h 3045798"/>
+              <a:gd name="csY10" fmla="*/ 1776577 h 3045798"/>
               <a:gd name="csX11" fmla="*/ 3089682 w 3089682"/>
-              <a:gd name="csY11" fmla="*/ 2283932 h 3045798"/>
+              <a:gd name="csY11" fmla="*/ 2255746 h 3045798"/>
               <a:gd name="csX12" fmla="*/ 3089682 w 3089682"/>
               <a:gd name="csY12" fmla="*/ 2932220 h 3045798"/>
               <a:gd name="csX13" fmla="*/ 2976104 w 3089682"/>
               <a:gd name="csY13" fmla="*/ 3045798 h 3045798"/>
-              <a:gd name="csX14" fmla="*/ 2403599 w 3089682"/>
+              <a:gd name="csX14" fmla="*/ 2489475 w 3089682"/>
               <a:gd name="csY14" fmla="*/ 3045798 h 3045798"/>
-              <a:gd name="csX15" fmla="*/ 1831094 w 3089682"/>
+              <a:gd name="csX15" fmla="*/ 1859719 w 3089682"/>
               <a:gd name="csY15" fmla="*/ 3045798 h 3045798"/>
-              <a:gd name="csX16" fmla="*/ 1201338 w 3089682"/>
+              <a:gd name="csX16" fmla="*/ 1287214 w 3089682"/>
               <a:gd name="csY16" fmla="*/ 3045798 h 3045798"/>
-              <a:gd name="csX17" fmla="*/ 628833 w 3089682"/>
+              <a:gd name="csX17" fmla="*/ 657458 w 3089682"/>
               <a:gd name="csY17" fmla="*/ 3045798 h 3045798"/>
               <a:gd name="csX18" fmla="*/ 113578 w 3089682"/>
               <a:gd name="csY18" fmla="*/ 3045798 h 3045798"/>
               <a:gd name="csX19" fmla="*/ 0 w 3089682"/>
               <a:gd name="csY19" fmla="*/ 2932220 h 3045798"/>
               <a:gd name="csX20" fmla="*/ 0 w 3089682"/>
-              <a:gd name="csY20" fmla="*/ 2340305 h 3045798"/>
+              <a:gd name="csY20" fmla="*/ 2396678 h 3045798"/>
               <a:gd name="csX21" fmla="*/ 0 w 3089682"/>
               <a:gd name="csY21" fmla="*/ 1832950 h 3045798"/>
               <a:gd name="csX22" fmla="*/ 0 w 3089682"/>
-              <a:gd name="csY22" fmla="*/ 1269221 h 3045798"/>
+              <a:gd name="csY22" fmla="*/ 1353780 h 3045798"/>
               <a:gd name="csX23" fmla="*/ 0 w 3089682"/>
-              <a:gd name="csY23" fmla="*/ 790052 h 3045798"/>
+              <a:gd name="csY23" fmla="*/ 733679 h 3045798"/>
               <a:gd name="csX24" fmla="*/ 0 w 3089682"/>
               <a:gd name="csY24" fmla="*/ 113578 h 3045798"/>
             </a:gdLst>
@@ -3969,7 +4195,133 @@
             </a:cxnLst>
             <a:rect l="l" t="t" r="r" b="b"/>
             <a:pathLst>
-              <a:path w="3089682" h="3045798" extrusionOk="0">
+              <a:path w="3089682" h="3045798" fill="none" extrusionOk="0">
+                <a:moveTo>
+                  <a:pt x="0" y="113578"/>
+                </a:moveTo>
+                <a:cubicBezTo>
+                  <a:pt x="-2913" y="56698"/>
+                  <a:pt x="48721" y="-2826"/>
+                  <a:pt x="113578" y="0"/>
+                </a:cubicBezTo>
+                <a:cubicBezTo>
+                  <a:pt x="385613" y="-3419"/>
+                  <a:pt x="523427" y="18597"/>
+                  <a:pt x="714708" y="0"/>
+                </a:cubicBezTo>
+                <a:cubicBezTo>
+                  <a:pt x="905989" y="-18597"/>
+                  <a:pt x="1086579" y="-25593"/>
+                  <a:pt x="1229963" y="0"/>
+                </a:cubicBezTo>
+                <a:cubicBezTo>
+                  <a:pt x="1373347" y="25593"/>
+                  <a:pt x="1591616" y="16637"/>
+                  <a:pt x="1831094" y="0"/>
+                </a:cubicBezTo>
+                <a:cubicBezTo>
+                  <a:pt x="2070572" y="-16637"/>
+                  <a:pt x="2166743" y="19205"/>
+                  <a:pt x="2317723" y="0"/>
+                </a:cubicBezTo>
+                <a:cubicBezTo>
+                  <a:pt x="2468703" y="-19205"/>
+                  <a:pt x="2725856" y="21944"/>
+                  <a:pt x="2976104" y="0"/>
+                </a:cubicBezTo>
+                <a:cubicBezTo>
+                  <a:pt x="3042464" y="3369"/>
+                  <a:pt x="3092169" y="49364"/>
+                  <a:pt x="3089682" y="113578"/>
+                </a:cubicBezTo>
+                <a:cubicBezTo>
+                  <a:pt x="3090607" y="268490"/>
+                  <a:pt x="3093944" y="443725"/>
+                  <a:pt x="3089682" y="677306"/>
+                </a:cubicBezTo>
+                <a:cubicBezTo>
+                  <a:pt x="3085420" y="910887"/>
+                  <a:pt x="3091397" y="1133360"/>
+                  <a:pt x="3089682" y="1269221"/>
+                </a:cubicBezTo>
+                <a:cubicBezTo>
+                  <a:pt x="3087967" y="1405083"/>
+                  <a:pt x="3092302" y="1531363"/>
+                  <a:pt x="3089682" y="1776577"/>
+                </a:cubicBezTo>
+                <a:cubicBezTo>
+                  <a:pt x="3087062" y="2021791"/>
+                  <a:pt x="3095634" y="2085604"/>
+                  <a:pt x="3089682" y="2255746"/>
+                </a:cubicBezTo>
+                <a:cubicBezTo>
+                  <a:pt x="3083730" y="2425888"/>
+                  <a:pt x="3107937" y="2756074"/>
+                  <a:pt x="3089682" y="2932220"/>
+                </a:cubicBezTo>
+                <a:cubicBezTo>
+                  <a:pt x="3094065" y="3005661"/>
+                  <a:pt x="3040463" y="3047413"/>
+                  <a:pt x="2976104" y="3045798"/>
+                </a:cubicBezTo>
+                <a:cubicBezTo>
+                  <a:pt x="2789344" y="3043098"/>
+                  <a:pt x="2673028" y="3054362"/>
+                  <a:pt x="2489475" y="3045798"/>
+                </a:cubicBezTo>
+                <a:cubicBezTo>
+                  <a:pt x="2305922" y="3037234"/>
+                  <a:pt x="2154587" y="3050694"/>
+                  <a:pt x="1859719" y="3045798"/>
+                </a:cubicBezTo>
+                <a:cubicBezTo>
+                  <a:pt x="1564851" y="3040902"/>
+                  <a:pt x="1526529" y="3058468"/>
+                  <a:pt x="1287214" y="3045798"/>
+                </a:cubicBezTo>
+                <a:cubicBezTo>
+                  <a:pt x="1047900" y="3033128"/>
+                  <a:pt x="837510" y="3049907"/>
+                  <a:pt x="657458" y="3045798"/>
+                </a:cubicBezTo>
+                <a:cubicBezTo>
+                  <a:pt x="477406" y="3041689"/>
+                  <a:pt x="284208" y="3060439"/>
+                  <a:pt x="113578" y="3045798"/>
+                </a:cubicBezTo>
+                <a:cubicBezTo>
+                  <a:pt x="50333" y="3047695"/>
+                  <a:pt x="1492" y="2992435"/>
+                  <a:pt x="0" y="2932220"/>
+                </a:cubicBezTo>
+                <a:cubicBezTo>
+                  <a:pt x="21530" y="2671725"/>
+                  <a:pt x="12485" y="2577801"/>
+                  <a:pt x="0" y="2396678"/>
+                </a:cubicBezTo>
+                <a:cubicBezTo>
+                  <a:pt x="-12485" y="2215555"/>
+                  <a:pt x="-13232" y="2038946"/>
+                  <a:pt x="0" y="1832950"/>
+                </a:cubicBezTo>
+                <a:cubicBezTo>
+                  <a:pt x="13232" y="1626954"/>
+                  <a:pt x="18956" y="1545131"/>
+                  <a:pt x="0" y="1353780"/>
+                </a:cubicBezTo>
+                <a:cubicBezTo>
+                  <a:pt x="-18956" y="1162429"/>
+                  <a:pt x="19170" y="954690"/>
+                  <a:pt x="0" y="733679"/>
+                </a:cubicBezTo>
+                <a:cubicBezTo>
+                  <a:pt x="-19170" y="512668"/>
+                  <a:pt x="22259" y="255375"/>
+                  <a:pt x="0" y="113578"/>
+                </a:cubicBezTo>
+                <a:close/>
+              </a:path>
+              <a:path w="3089682" h="3045798" stroke="0" extrusionOk="0">
                 <a:moveTo>
                   <a:pt x="0" y="113578"/>
                 </a:moveTo>
@@ -4142,7 +4494,7 @@
           <a:lstStyle/>
           <a:p>
             <a:pPr algn="ctr"/>
-            <a:endParaRPr lang="en-US"/>
+            <a:endParaRPr lang="en-US" sz="1150"/>
           </a:p>
         </p:txBody>
       </p:sp>
@@ -4161,57 +4513,57 @@
         <p:spPr>
           <a:xfrm>
             <a:off x="592413" y="522159"/>
-            <a:ext cx="3395689" cy="2649541"/>
+            <a:ext cx="3395689" cy="2983517"/>
           </a:xfrm>
           <a:custGeom>
             <a:avLst/>
             <a:gdLst>
               <a:gd name="csX0" fmla="*/ 0 w 3395689"/>
-              <a:gd name="csY0" fmla="*/ 98801 h 2649541"/>
-              <a:gd name="csX1" fmla="*/ 98801 w 3395689"/>
-              <a:gd name="csY1" fmla="*/ 0 h 2649541"/>
-              <a:gd name="csX2" fmla="*/ 738418 w 3395689"/>
-              <a:gd name="csY2" fmla="*/ 0 h 2649541"/>
-              <a:gd name="csX3" fmla="*/ 1314074 w 3395689"/>
-              <a:gd name="csY3" fmla="*/ 0 h 2649541"/>
-              <a:gd name="csX4" fmla="*/ 1985672 w 3395689"/>
-              <a:gd name="csY4" fmla="*/ 0 h 2649541"/>
-              <a:gd name="csX5" fmla="*/ 2561328 w 3395689"/>
-              <a:gd name="csY5" fmla="*/ 0 h 2649541"/>
-              <a:gd name="csX6" fmla="*/ 3296888 w 3395689"/>
-              <a:gd name="csY6" fmla="*/ 0 h 2649541"/>
+              <a:gd name="csY0" fmla="*/ 111255 h 2983517"/>
+              <a:gd name="csX1" fmla="*/ 111255 w 3395689"/>
+              <a:gd name="csY1" fmla="*/ 0 h 2983517"/>
+              <a:gd name="csX2" fmla="*/ 745891 w 3395689"/>
+              <a:gd name="csY2" fmla="*/ 0 h 2983517"/>
+              <a:gd name="csX3" fmla="*/ 1317063 w 3395689"/>
+              <a:gd name="csY3" fmla="*/ 0 h 2983517"/>
+              <a:gd name="csX4" fmla="*/ 1983431 w 3395689"/>
+              <a:gd name="csY4" fmla="*/ 0 h 2983517"/>
+              <a:gd name="csX5" fmla="*/ 2554603 w 3395689"/>
+              <a:gd name="csY5" fmla="*/ 0 h 2983517"/>
+              <a:gd name="csX6" fmla="*/ 3284434 w 3395689"/>
+              <a:gd name="csY6" fmla="*/ 0 h 2983517"/>
               <a:gd name="csX7" fmla="*/ 3395689 w 3395689"/>
-              <a:gd name="csY7" fmla="*/ 98801 h 2649541"/>
+              <a:gd name="csY7" fmla="*/ 111255 h 2983517"/>
               <a:gd name="csX8" fmla="*/ 3395689 w 3395689"/>
-              <a:gd name="csY8" fmla="*/ 736305 h 2649541"/>
+              <a:gd name="csY8" fmla="*/ 829117 h 2983517"/>
               <a:gd name="csX9" fmla="*/ 3395689 w 3395689"/>
-              <a:gd name="csY9" fmla="*/ 1275732 h 2649541"/>
+              <a:gd name="csY9" fmla="*/ 1436538 h 2983517"/>
               <a:gd name="csX10" fmla="*/ 3395689 w 3395689"/>
-              <a:gd name="csY10" fmla="*/ 1839678 h 2649541"/>
+              <a:gd name="csY10" fmla="*/ 2071570 h 2983517"/>
               <a:gd name="csX11" fmla="*/ 3395689 w 3395689"/>
-              <a:gd name="csY11" fmla="*/ 2550740 h 2649541"/>
-              <a:gd name="csX12" fmla="*/ 3296888 w 3395689"/>
-              <a:gd name="csY12" fmla="*/ 2649541 h 2649541"/>
-              <a:gd name="csX13" fmla="*/ 2721232 w 3395689"/>
-              <a:gd name="csY13" fmla="*/ 2649541 h 2649541"/>
-              <a:gd name="csX14" fmla="*/ 2113596 w 3395689"/>
-              <a:gd name="csY14" fmla="*/ 2649541 h 2649541"/>
-              <a:gd name="csX15" fmla="*/ 1473978 w 3395689"/>
-              <a:gd name="csY15" fmla="*/ 2649541 h 2649541"/>
-              <a:gd name="csX16" fmla="*/ 898323 w 3395689"/>
-              <a:gd name="csY16" fmla="*/ 2649541 h 2649541"/>
-              <a:gd name="csX17" fmla="*/ 98801 w 3395689"/>
-              <a:gd name="csY17" fmla="*/ 2649541 h 2649541"/>
+              <a:gd name="csY11" fmla="*/ 2872262 h 2983517"/>
+              <a:gd name="csX12" fmla="*/ 3284434 w 3395689"/>
+              <a:gd name="csY12" fmla="*/ 2983517 h 2983517"/>
+              <a:gd name="csX13" fmla="*/ 2713262 w 3395689"/>
+              <a:gd name="csY13" fmla="*/ 2983517 h 2983517"/>
+              <a:gd name="csX14" fmla="*/ 2110358 w 3395689"/>
+              <a:gd name="csY14" fmla="*/ 2983517 h 2983517"/>
+              <a:gd name="csX15" fmla="*/ 1475722 w 3395689"/>
+              <a:gd name="csY15" fmla="*/ 2983517 h 2983517"/>
+              <a:gd name="csX16" fmla="*/ 904550 w 3395689"/>
+              <a:gd name="csY16" fmla="*/ 2983517 h 2983517"/>
+              <a:gd name="csX17" fmla="*/ 111255 w 3395689"/>
+              <a:gd name="csY17" fmla="*/ 2983517 h 2983517"/>
               <a:gd name="csX18" fmla="*/ 0 w 3395689"/>
-              <a:gd name="csY18" fmla="*/ 2550740 h 2649541"/>
+              <a:gd name="csY18" fmla="*/ 2872262 h 2983517"/>
               <a:gd name="csX19" fmla="*/ 0 w 3395689"/>
-              <a:gd name="csY19" fmla="*/ 2011313 h 2649541"/>
+              <a:gd name="csY19" fmla="*/ 2264840 h 2983517"/>
               <a:gd name="csX20" fmla="*/ 0 w 3395689"/>
-              <a:gd name="csY20" fmla="*/ 1422848 h 2649541"/>
+              <a:gd name="csY20" fmla="*/ 1602199 h 2983517"/>
               <a:gd name="csX21" fmla="*/ 0 w 3395689"/>
-              <a:gd name="csY21" fmla="*/ 785344 h 2649541"/>
+              <a:gd name="csY21" fmla="*/ 884337 h 2983517"/>
               <a:gd name="csX22" fmla="*/ 0 w 3395689"/>
-              <a:gd name="csY22" fmla="*/ 98801 h 2649541"/>
+              <a:gd name="csY22" fmla="*/ 111255 h 2983517"/>
             </a:gdLst>
             <a:ahLst/>
             <a:cxnLst>
@@ -4287,235 +4639,235 @@
             </a:cxnLst>
             <a:rect l="l" t="t" r="r" b="b"/>
             <a:pathLst>
-              <a:path w="3395689" h="2649541" fill="none" extrusionOk="0">
+              <a:path w="3395689" h="2983517" fill="none" extrusionOk="0">
                 <a:moveTo>
-                  <a:pt x="0" y="98801"/>
+                  <a:pt x="0" y="111255"/>
                 </a:moveTo>
                 <a:cubicBezTo>
-                  <a:pt x="-6529" y="43865"/>
-                  <a:pt x="53131" y="7659"/>
-                  <a:pt x="98801" y="0"/>
-                </a:cubicBezTo>
-                <a:cubicBezTo>
-                  <a:pt x="233829" y="-6940"/>
-                  <a:pt x="447732" y="-11095"/>
-                  <a:pt x="738418" y="0"/>
-                </a:cubicBezTo>
-                <a:cubicBezTo>
-                  <a:pt x="1029104" y="11095"/>
-                  <a:pt x="1080605" y="18238"/>
-                  <a:pt x="1314074" y="0"/>
-                </a:cubicBezTo>
-                <a:cubicBezTo>
-                  <a:pt x="1547543" y="-18238"/>
-                  <a:pt x="1669259" y="23199"/>
-                  <a:pt x="1985672" y="0"/>
-                </a:cubicBezTo>
-                <a:cubicBezTo>
-                  <a:pt x="2302085" y="-23199"/>
-                  <a:pt x="2436182" y="14460"/>
-                  <a:pt x="2561328" y="0"/>
-                </a:cubicBezTo>
-                <a:cubicBezTo>
-                  <a:pt x="2686474" y="-14460"/>
-                  <a:pt x="3148563" y="-10648"/>
-                  <a:pt x="3296888" y="0"/>
-                </a:cubicBezTo>
-                <a:cubicBezTo>
-                  <a:pt x="3347069" y="4439"/>
-                  <a:pt x="3393145" y="49679"/>
-                  <a:pt x="3395689" y="98801"/>
-                </a:cubicBezTo>
-                <a:cubicBezTo>
-                  <a:pt x="3388736" y="284030"/>
-                  <a:pt x="3392957" y="583582"/>
-                  <a:pt x="3395689" y="736305"/>
-                </a:cubicBezTo>
-                <a:cubicBezTo>
-                  <a:pt x="3398421" y="889028"/>
-                  <a:pt x="3390835" y="1017668"/>
-                  <a:pt x="3395689" y="1275732"/>
-                </a:cubicBezTo>
-                <a:cubicBezTo>
-                  <a:pt x="3400543" y="1533796"/>
-                  <a:pt x="3413361" y="1585865"/>
-                  <a:pt x="3395689" y="1839678"/>
-                </a:cubicBezTo>
-                <a:cubicBezTo>
-                  <a:pt x="3378017" y="2093491"/>
-                  <a:pt x="3392932" y="2299550"/>
-                  <a:pt x="3395689" y="2550740"/>
-                </a:cubicBezTo>
-                <a:cubicBezTo>
-                  <a:pt x="3403413" y="2603262"/>
-                  <a:pt x="3350652" y="2655099"/>
-                  <a:pt x="3296888" y="2649541"/>
-                </a:cubicBezTo>
-                <a:cubicBezTo>
-                  <a:pt x="3092848" y="2663486"/>
-                  <a:pt x="2949903" y="2649835"/>
-                  <a:pt x="2721232" y="2649541"/>
-                </a:cubicBezTo>
-                <a:cubicBezTo>
-                  <a:pt x="2492561" y="2649247"/>
-                  <a:pt x="2387875" y="2665246"/>
-                  <a:pt x="2113596" y="2649541"/>
-                </a:cubicBezTo>
-                <a:cubicBezTo>
-                  <a:pt x="1839317" y="2633836"/>
-                  <a:pt x="1695743" y="2659617"/>
-                  <a:pt x="1473978" y="2649541"/>
-                </a:cubicBezTo>
-                <a:cubicBezTo>
-                  <a:pt x="1252213" y="2639465"/>
-                  <a:pt x="1127005" y="2659689"/>
-                  <a:pt x="898323" y="2649541"/>
-                </a:cubicBezTo>
-                <a:cubicBezTo>
-                  <a:pt x="669641" y="2639393"/>
-                  <a:pt x="283637" y="2666092"/>
-                  <a:pt x="98801" y="2649541"/>
-                </a:cubicBezTo>
-                <a:cubicBezTo>
-                  <a:pt x="41733" y="2645073"/>
-                  <a:pt x="-4094" y="2607209"/>
-                  <a:pt x="0" y="2550740"/>
-                </a:cubicBezTo>
-                <a:cubicBezTo>
-                  <a:pt x="-13432" y="2356050"/>
-                  <a:pt x="23978" y="2239595"/>
-                  <a:pt x="0" y="2011313"/>
-                </a:cubicBezTo>
-                <a:cubicBezTo>
-                  <a:pt x="-23978" y="1783031"/>
-                  <a:pt x="-9803" y="1640217"/>
-                  <a:pt x="0" y="1422848"/>
-                </a:cubicBezTo>
-                <a:cubicBezTo>
-                  <a:pt x="9803" y="1205480"/>
-                  <a:pt x="-7944" y="1096293"/>
-                  <a:pt x="0" y="785344"/>
-                </a:cubicBezTo>
-                <a:cubicBezTo>
-                  <a:pt x="7944" y="474395"/>
-                  <a:pt x="18204" y="291433"/>
-                  <a:pt x="0" y="98801"/>
+                  <a:pt x="-1605" y="49720"/>
+                  <a:pt x="51521" y="1472"/>
+                  <a:pt x="111255" y="0"/>
+                </a:cubicBezTo>
+                <a:cubicBezTo>
+                  <a:pt x="334392" y="-10530"/>
+                  <a:pt x="434209" y="-29733"/>
+                  <a:pt x="745891" y="0"/>
+                </a:cubicBezTo>
+                <a:cubicBezTo>
+                  <a:pt x="1057573" y="29733"/>
+                  <a:pt x="1117185" y="-9698"/>
+                  <a:pt x="1317063" y="0"/>
+                </a:cubicBezTo>
+                <a:cubicBezTo>
+                  <a:pt x="1516941" y="9698"/>
+                  <a:pt x="1705953" y="27975"/>
+                  <a:pt x="1983431" y="0"/>
+                </a:cubicBezTo>
+                <a:cubicBezTo>
+                  <a:pt x="2260909" y="-27975"/>
+                  <a:pt x="2390408" y="-16814"/>
+                  <a:pt x="2554603" y="0"/>
+                </a:cubicBezTo>
+                <a:cubicBezTo>
+                  <a:pt x="2718798" y="16814"/>
+                  <a:pt x="3110244" y="-20911"/>
+                  <a:pt x="3284434" y="0"/>
+                </a:cubicBezTo>
+                <a:cubicBezTo>
+                  <a:pt x="3338366" y="7604"/>
+                  <a:pt x="3391165" y="59493"/>
+                  <a:pt x="3395689" y="111255"/>
+                </a:cubicBezTo>
+                <a:cubicBezTo>
+                  <a:pt x="3389482" y="455840"/>
+                  <a:pt x="3402646" y="520821"/>
+                  <a:pt x="3395689" y="829117"/>
+                </a:cubicBezTo>
+                <a:cubicBezTo>
+                  <a:pt x="3388732" y="1137413"/>
+                  <a:pt x="3402705" y="1170224"/>
+                  <a:pt x="3395689" y="1436538"/>
+                </a:cubicBezTo>
+                <a:cubicBezTo>
+                  <a:pt x="3388673" y="1702852"/>
+                  <a:pt x="3368704" y="1846508"/>
+                  <a:pt x="3395689" y="2071570"/>
+                </a:cubicBezTo>
+                <a:cubicBezTo>
+                  <a:pt x="3422674" y="2296632"/>
+                  <a:pt x="3430583" y="2475897"/>
+                  <a:pt x="3395689" y="2872262"/>
+                </a:cubicBezTo>
+                <a:cubicBezTo>
+                  <a:pt x="3406337" y="2930888"/>
+                  <a:pt x="3344044" y="2996219"/>
+                  <a:pt x="3284434" y="2983517"/>
+                </a:cubicBezTo>
+                <a:cubicBezTo>
+                  <a:pt x="3114646" y="2985356"/>
+                  <a:pt x="2982244" y="2961314"/>
+                  <a:pt x="2713262" y="2983517"/>
+                </a:cubicBezTo>
+                <a:cubicBezTo>
+                  <a:pt x="2444280" y="3005720"/>
+                  <a:pt x="2380365" y="2993922"/>
+                  <a:pt x="2110358" y="2983517"/>
+                </a:cubicBezTo>
+                <a:cubicBezTo>
+                  <a:pt x="1840351" y="2973112"/>
+                  <a:pt x="1619248" y="2999744"/>
+                  <a:pt x="1475722" y="2983517"/>
+                </a:cubicBezTo>
+                <a:cubicBezTo>
+                  <a:pt x="1332196" y="2967290"/>
+                  <a:pt x="1095547" y="3004598"/>
+                  <a:pt x="904550" y="2983517"/>
+                </a:cubicBezTo>
+                <a:cubicBezTo>
+                  <a:pt x="713553" y="2962436"/>
+                  <a:pt x="329824" y="2965505"/>
+                  <a:pt x="111255" y="2983517"/>
+                </a:cubicBezTo>
+                <a:cubicBezTo>
+                  <a:pt x="46759" y="2978066"/>
+                  <a:pt x="-6141" y="2936560"/>
+                  <a:pt x="0" y="2872262"/>
+                </a:cubicBezTo>
+                <a:cubicBezTo>
+                  <a:pt x="-1873" y="2627661"/>
+                  <a:pt x="3353" y="2565988"/>
+                  <a:pt x="0" y="2264840"/>
+                </a:cubicBezTo>
+                <a:cubicBezTo>
+                  <a:pt x="-3353" y="1963692"/>
+                  <a:pt x="4466" y="1734774"/>
+                  <a:pt x="0" y="1602199"/>
+                </a:cubicBezTo>
+                <a:cubicBezTo>
+                  <a:pt x="-4466" y="1469624"/>
+                  <a:pt x="-19098" y="1190104"/>
+                  <a:pt x="0" y="884337"/>
+                </a:cubicBezTo>
+                <a:cubicBezTo>
+                  <a:pt x="19098" y="578570"/>
+                  <a:pt x="-4000" y="386563"/>
+                  <a:pt x="0" y="111255"/>
                 </a:cubicBezTo>
                 <a:close/>
               </a:path>
-              <a:path w="3395689" h="2649541" stroke="0" extrusionOk="0">
+              <a:path w="3395689" h="2983517" stroke="0" extrusionOk="0">
                 <a:moveTo>
-                  <a:pt x="0" y="98801"/>
+                  <a:pt x="0" y="111255"/>
                 </a:moveTo>
                 <a:cubicBezTo>
-                  <a:pt x="-11438" y="37180"/>
-                  <a:pt x="35341" y="3338"/>
-                  <a:pt x="98801" y="0"/>
-                </a:cubicBezTo>
-                <a:cubicBezTo>
-                  <a:pt x="425594" y="-33939"/>
-                  <a:pt x="650245" y="20864"/>
-                  <a:pt x="802380" y="0"/>
-                </a:cubicBezTo>
-                <a:cubicBezTo>
-                  <a:pt x="954515" y="-20864"/>
-                  <a:pt x="1240841" y="867"/>
-                  <a:pt x="1410017" y="0"/>
-                </a:cubicBezTo>
-                <a:cubicBezTo>
-                  <a:pt x="1579193" y="-867"/>
-                  <a:pt x="1853110" y="-13538"/>
-                  <a:pt x="1985672" y="0"/>
-                </a:cubicBezTo>
-                <a:cubicBezTo>
-                  <a:pt x="2118234" y="13538"/>
-                  <a:pt x="2462817" y="40"/>
-                  <a:pt x="2657271" y="0"/>
-                </a:cubicBezTo>
-                <a:cubicBezTo>
-                  <a:pt x="2851725" y="-40"/>
-                  <a:pt x="3117929" y="31055"/>
-                  <a:pt x="3296888" y="0"/>
-                </a:cubicBezTo>
-                <a:cubicBezTo>
-                  <a:pt x="3353442" y="-3236"/>
-                  <a:pt x="3386150" y="52618"/>
-                  <a:pt x="3395689" y="98801"/>
-                </a:cubicBezTo>
-                <a:cubicBezTo>
-                  <a:pt x="3407902" y="222143"/>
-                  <a:pt x="3422094" y="418876"/>
-                  <a:pt x="3395689" y="711786"/>
-                </a:cubicBezTo>
-                <a:cubicBezTo>
-                  <a:pt x="3369284" y="1004696"/>
-                  <a:pt x="3412273" y="1141130"/>
-                  <a:pt x="3395689" y="1251212"/>
-                </a:cubicBezTo>
-                <a:cubicBezTo>
-                  <a:pt x="3379105" y="1361294"/>
-                  <a:pt x="3370991" y="1679342"/>
-                  <a:pt x="3395689" y="1864197"/>
-                </a:cubicBezTo>
-                <a:cubicBezTo>
-                  <a:pt x="3420387" y="2049053"/>
-                  <a:pt x="3425690" y="2371192"/>
-                  <a:pt x="3395689" y="2550740"/>
-                </a:cubicBezTo>
-                <a:cubicBezTo>
-                  <a:pt x="3399786" y="2601257"/>
-                  <a:pt x="3361275" y="2643208"/>
-                  <a:pt x="3296888" y="2649541"/>
-                </a:cubicBezTo>
-                <a:cubicBezTo>
-                  <a:pt x="3006049" y="2630507"/>
-                  <a:pt x="2905886" y="2646250"/>
-                  <a:pt x="2657271" y="2649541"/>
-                </a:cubicBezTo>
-                <a:cubicBezTo>
-                  <a:pt x="2408656" y="2652832"/>
-                  <a:pt x="2272205" y="2647845"/>
-                  <a:pt x="2081615" y="2649541"/>
-                </a:cubicBezTo>
-                <a:cubicBezTo>
-                  <a:pt x="1891025" y="2651237"/>
-                  <a:pt x="1698465" y="2638402"/>
-                  <a:pt x="1441998" y="2649541"/>
-                </a:cubicBezTo>
-                <a:cubicBezTo>
-                  <a:pt x="1185531" y="2660680"/>
-                  <a:pt x="910653" y="2616272"/>
-                  <a:pt x="738418" y="2649541"/>
-                </a:cubicBezTo>
-                <a:cubicBezTo>
-                  <a:pt x="566183" y="2682810"/>
-                  <a:pt x="325783" y="2664247"/>
-                  <a:pt x="98801" y="2649541"/>
-                </a:cubicBezTo>
-                <a:cubicBezTo>
-                  <a:pt x="38802" y="2659255"/>
-                  <a:pt x="10737" y="2613285"/>
-                  <a:pt x="0" y="2550740"/>
-                </a:cubicBezTo>
-                <a:cubicBezTo>
-                  <a:pt x="15430" y="2318141"/>
-                  <a:pt x="-23397" y="2113246"/>
-                  <a:pt x="0" y="1986794"/>
-                </a:cubicBezTo>
-                <a:cubicBezTo>
-                  <a:pt x="23397" y="1860342"/>
-                  <a:pt x="-14138" y="1672846"/>
-                  <a:pt x="0" y="1373809"/>
-                </a:cubicBezTo>
-                <a:cubicBezTo>
-                  <a:pt x="14138" y="1074772"/>
-                  <a:pt x="4869" y="1040857"/>
-                  <a:pt x="0" y="809863"/>
-                </a:cubicBezTo>
-                <a:cubicBezTo>
-                  <a:pt x="-4869" y="578869"/>
-                  <a:pt x="28704" y="402421"/>
-                  <a:pt x="0" y="98801"/>
+                  <a:pt x="-8716" y="44435"/>
+                  <a:pt x="48213" y="600"/>
+                  <a:pt x="111255" y="0"/>
+                </a:cubicBezTo>
+                <a:cubicBezTo>
+                  <a:pt x="442657" y="-25087"/>
+                  <a:pt x="464960" y="31486"/>
+                  <a:pt x="809354" y="0"/>
+                </a:cubicBezTo>
+                <a:cubicBezTo>
+                  <a:pt x="1153748" y="-31486"/>
+                  <a:pt x="1280905" y="3456"/>
+                  <a:pt x="1412258" y="0"/>
+                </a:cubicBezTo>
+                <a:cubicBezTo>
+                  <a:pt x="1543611" y="-3456"/>
+                  <a:pt x="1763778" y="-18638"/>
+                  <a:pt x="1983431" y="0"/>
+                </a:cubicBezTo>
+                <a:cubicBezTo>
+                  <a:pt x="2203084" y="18638"/>
+                  <a:pt x="2512066" y="13613"/>
+                  <a:pt x="2649798" y="0"/>
+                </a:cubicBezTo>
+                <a:cubicBezTo>
+                  <a:pt x="2787530" y="-13613"/>
+                  <a:pt x="3057990" y="-12142"/>
+                  <a:pt x="3284434" y="0"/>
+                </a:cubicBezTo>
+                <a:cubicBezTo>
+                  <a:pt x="3349731" y="-6271"/>
+                  <a:pt x="3384757" y="59418"/>
+                  <a:pt x="3395689" y="111255"/>
+                </a:cubicBezTo>
+                <a:cubicBezTo>
+                  <a:pt x="3366918" y="318686"/>
+                  <a:pt x="3390902" y="645109"/>
+                  <a:pt x="3395689" y="801507"/>
+                </a:cubicBezTo>
+                <a:cubicBezTo>
+                  <a:pt x="3400476" y="957905"/>
+                  <a:pt x="3374173" y="1112823"/>
+                  <a:pt x="3395689" y="1408928"/>
+                </a:cubicBezTo>
+                <a:cubicBezTo>
+                  <a:pt x="3417205" y="1705033"/>
+                  <a:pt x="3422688" y="1931879"/>
+                  <a:pt x="3395689" y="2099180"/>
+                </a:cubicBezTo>
+                <a:cubicBezTo>
+                  <a:pt x="3368690" y="2266481"/>
+                  <a:pt x="3376869" y="2587467"/>
+                  <a:pt x="3395689" y="2872262"/>
+                </a:cubicBezTo>
+                <a:cubicBezTo>
+                  <a:pt x="3400901" y="2928556"/>
+                  <a:pt x="3357066" y="2976303"/>
+                  <a:pt x="3284434" y="2983517"/>
+                </a:cubicBezTo>
+                <a:cubicBezTo>
+                  <a:pt x="3026871" y="2987378"/>
+                  <a:pt x="2956904" y="2971114"/>
+                  <a:pt x="2649798" y="2983517"/>
+                </a:cubicBezTo>
+                <a:cubicBezTo>
+                  <a:pt x="2342692" y="2995920"/>
+                  <a:pt x="2258881" y="3008905"/>
+                  <a:pt x="2078626" y="2983517"/>
+                </a:cubicBezTo>
+                <a:cubicBezTo>
+                  <a:pt x="1898371" y="2958129"/>
+                  <a:pt x="1595184" y="2975432"/>
+                  <a:pt x="1443990" y="2983517"/>
+                </a:cubicBezTo>
+                <a:cubicBezTo>
+                  <a:pt x="1292796" y="2991602"/>
+                  <a:pt x="956787" y="3006518"/>
+                  <a:pt x="745891" y="2983517"/>
+                </a:cubicBezTo>
+                <a:cubicBezTo>
+                  <a:pt x="534995" y="2960516"/>
+                  <a:pt x="397760" y="3000526"/>
+                  <a:pt x="111255" y="2983517"/>
+                </a:cubicBezTo>
+                <a:cubicBezTo>
+                  <a:pt x="46021" y="2990294"/>
+                  <a:pt x="11405" y="2942181"/>
+                  <a:pt x="0" y="2872262"/>
+                </a:cubicBezTo>
+                <a:cubicBezTo>
+                  <a:pt x="20205" y="2720368"/>
+                  <a:pt x="17061" y="2450172"/>
+                  <a:pt x="0" y="2237230"/>
+                </a:cubicBezTo>
+                <a:cubicBezTo>
+                  <a:pt x="-17061" y="2024288"/>
+                  <a:pt x="-20996" y="1758986"/>
+                  <a:pt x="0" y="1546979"/>
+                </a:cubicBezTo>
+                <a:cubicBezTo>
+                  <a:pt x="20996" y="1334972"/>
+                  <a:pt x="-23208" y="1183958"/>
+                  <a:pt x="0" y="911947"/>
+                </a:cubicBezTo>
+                <a:cubicBezTo>
+                  <a:pt x="23208" y="639936"/>
+                  <a:pt x="-1919" y="335919"/>
+                  <a:pt x="0" y="111255"/>
                 </a:cubicBezTo>
                 <a:close/>
               </a:path>
@@ -4566,59 +4918,7 @@
           <a:lstStyle/>
           <a:p>
             <a:pPr algn="ctr"/>
-            <a:endParaRPr lang="en-US"/>
-          </a:p>
-        </p:txBody>
-      </p:sp>
-      <p:sp>
-        <p:nvSpPr>
-          <p:cNvPr id="35" name="Rectangle 34">
-            <a:extLst>
-              <a:ext uri="{FF2B5EF4-FFF2-40B4-BE49-F238E27FC236}">
-                <a16:creationId xmlns:a16="http://schemas.microsoft.com/office/drawing/2014/main" id="{8CA22693-1AA5-1B6D-2BF6-33D33D7F17DE}"/>
-              </a:ext>
-            </a:extLst>
-          </p:cNvPr>
-          <p:cNvSpPr/>
-          <p:nvPr/>
-        </p:nvSpPr>
-        <p:spPr>
-          <a:xfrm>
-            <a:off x="819457" y="645922"/>
-            <a:ext cx="2794189" cy="1806456"/>
-          </a:xfrm>
-          <a:prstGeom prst="rect">
-            <a:avLst/>
-          </a:prstGeom>
-          <a:solidFill>
-            <a:schemeClr val="tx2">
-              <a:lumMod val="10000"/>
-              <a:lumOff val="90000"/>
-            </a:schemeClr>
-          </a:solidFill>
-        </p:spPr>
-        <p:style>
-          <a:lnRef idx="2">
-            <a:schemeClr val="accent1">
-              <a:shade val="15000"/>
-            </a:schemeClr>
-          </a:lnRef>
-          <a:fillRef idx="1">
-            <a:schemeClr val="accent1"/>
-          </a:fillRef>
-          <a:effectRef idx="0">
-            <a:schemeClr val="accent1"/>
-          </a:effectRef>
-          <a:fontRef idx="minor">
-            <a:schemeClr val="lt1"/>
-          </a:fontRef>
-        </p:style>
-        <p:txBody>
-          <a:bodyPr rtlCol="0" anchor="ctr"/>
-          <a:lstStyle/>
-          <a:p>
-            <a:pPr algn="ctr"/>
-            <a:endParaRPr lang="en-US" sz="1400"/>
+            <a:endParaRPr lang="en-US" sz="1150"/>
           </a:p>
         </p:txBody>
       </p:sp>
@@ -4785,7 +5085,7 @@
           <a:lstStyle/>
           <a:p>
             <a:pPr algn="ctr"/>
-            <a:endParaRPr lang="en-US" sz="1400"/>
+            <a:endParaRPr lang="en-US" sz="1150"/>
           </a:p>
         </p:txBody>
       </p:sp>
@@ -4919,7 +5219,7 @@
           <a:lstStyle/>
           <a:p>
             <a:pPr algn="ctr"/>
-            <a:endParaRPr lang="en-US" sz="1400"/>
+            <a:endParaRPr lang="en-US" sz="1150"/>
           </a:p>
         </p:txBody>
       </p:sp>
@@ -4939,7 +5239,7 @@
         </p:nvCxnSpPr>
         <p:spPr>
           <a:xfrm>
-            <a:off x="2202898" y="2447306"/>
+            <a:off x="2227325" y="2640254"/>
             <a:ext cx="0" cy="427953"/>
           </a:xfrm>
           <a:prstGeom prst="line">
@@ -4963,10 +5263,10 @@
       </p:cxnSp>
       <p:sp>
         <p:nvSpPr>
-          <p:cNvPr id="11" name="Rectangle 10">
-            <a:extLst>
-              <a:ext uri="{FF2B5EF4-FFF2-40B4-BE49-F238E27FC236}">
-                <a16:creationId xmlns:a16="http://schemas.microsoft.com/office/drawing/2014/main" id="{87478BF3-2D43-FD80-7E4D-584FC79AFA1E}"/>
+          <p:cNvPr id="19" name="Rectangle 18">
+            <a:extLst>
+              <a:ext uri="{FF2B5EF4-FFF2-40B4-BE49-F238E27FC236}">
+                <a16:creationId xmlns:a16="http://schemas.microsoft.com/office/drawing/2014/main" id="{5061E8E3-7AAD-E49E-7A05-755BDD96E19D}"/>
               </a:ext>
             </a:extLst>
           </p:cNvPr>
@@ -4975,12 +5275,15 @@
         </p:nvSpPr>
         <p:spPr>
           <a:xfrm>
-            <a:off x="921458" y="1203035"/>
-            <a:ext cx="2243117" cy="274776"/>
+            <a:off x="8397645" y="1121792"/>
+            <a:ext cx="2066434" cy="291977"/>
           </a:xfrm>
           <a:prstGeom prst="rect">
             <a:avLst/>
           </a:prstGeom>
+          <a:solidFill>
+            <a:schemeClr val="tx1"/>
+          </a:solidFill>
         </p:spPr>
         <p:style>
           <a:lnRef idx="2">
@@ -5004,210 +5307,8 @@
           <a:p>
             <a:pPr algn="ctr"/>
             <a:r>
-              <a:rPr lang="en-US" sz="1400" dirty="0"/>
-              <a:t>Curate to CDISC standard</a:t>
-            </a:r>
-          </a:p>
-        </p:txBody>
-      </p:sp>
-      <p:sp>
-        <p:nvSpPr>
-          <p:cNvPr id="12" name="Rectangle 11">
-            <a:extLst>
-              <a:ext uri="{FF2B5EF4-FFF2-40B4-BE49-F238E27FC236}">
-                <a16:creationId xmlns:a16="http://schemas.microsoft.com/office/drawing/2014/main" id="{1DF9767B-DDA3-30B6-4588-DE8B4ED86D54}"/>
-              </a:ext>
-            </a:extLst>
-          </p:cNvPr>
-          <p:cNvSpPr/>
-          <p:nvPr/>
-        </p:nvSpPr>
-        <p:spPr>
-          <a:xfrm>
-            <a:off x="926008" y="1622935"/>
-            <a:ext cx="2243104" cy="273592"/>
-          </a:xfrm>
-          <a:prstGeom prst="rect">
-            <a:avLst/>
-          </a:prstGeom>
-        </p:spPr>
-        <p:style>
-          <a:lnRef idx="2">
-            <a:schemeClr val="accent1">
-              <a:shade val="15000"/>
-            </a:schemeClr>
-          </a:lnRef>
-          <a:fillRef idx="1">
-            <a:schemeClr val="accent1"/>
-          </a:fillRef>
-          <a:effectRef idx="0">
-            <a:schemeClr val="accent1"/>
-          </a:effectRef>
-          <a:fontRef idx="minor">
-            <a:schemeClr val="lt1"/>
-          </a:fontRef>
-        </p:style>
-        <p:txBody>
-          <a:bodyPr rtlCol="0" anchor="ctr"/>
-          <a:lstStyle/>
-          <a:p>
-            <a:pPr algn="ctr"/>
-            <a:r>
-              <a:rPr lang="en-US" sz="1400" dirty="0"/>
-              <a:t>Apply eligibility criteria</a:t>
-            </a:r>
-          </a:p>
-        </p:txBody>
-      </p:sp>
-      <p:sp>
-        <p:nvSpPr>
-          <p:cNvPr id="19" name="Rectangle 18">
-            <a:extLst>
-              <a:ext uri="{FF2B5EF4-FFF2-40B4-BE49-F238E27FC236}">
-                <a16:creationId xmlns:a16="http://schemas.microsoft.com/office/drawing/2014/main" id="{5061E8E3-7AAD-E49E-7A05-755BDD96E19D}"/>
-              </a:ext>
-            </a:extLst>
-          </p:cNvPr>
-          <p:cNvSpPr/>
-          <p:nvPr/>
-        </p:nvSpPr>
-        <p:spPr>
-          <a:xfrm>
-            <a:off x="8397645" y="1121792"/>
-            <a:ext cx="2066434" cy="291977"/>
-          </a:xfrm>
-          <a:prstGeom prst="rect">
-            <a:avLst/>
-          </a:prstGeom>
-          <a:solidFill>
-            <a:schemeClr val="tx1"/>
-          </a:solidFill>
-        </p:spPr>
-        <p:style>
-          <a:lnRef idx="2">
-            <a:schemeClr val="accent1">
-              <a:shade val="15000"/>
-            </a:schemeClr>
-          </a:lnRef>
-          <a:fillRef idx="1">
-            <a:schemeClr val="accent1"/>
-          </a:fillRef>
-          <a:effectRef idx="0">
-            <a:schemeClr val="accent1"/>
-          </a:effectRef>
-          <a:fontRef idx="minor">
-            <a:schemeClr val="lt1"/>
-          </a:fontRef>
-        </p:style>
-        <p:txBody>
-          <a:bodyPr rtlCol="0" anchor="ctr"/>
-          <a:lstStyle/>
-          <a:p>
-            <a:pPr algn="ctr"/>
-            <a:r>
-              <a:rPr lang="en-US" sz="1400" dirty="0"/>
+              <a:rPr lang="en-US" sz="1150" dirty="0"/>
               <a:t>Bootstrapping</a:t>
-            </a:r>
-          </a:p>
-        </p:txBody>
-      </p:sp>
-      <p:sp>
-        <p:nvSpPr>
-          <p:cNvPr id="32" name="Rectangle 31">
-            <a:extLst>
-              <a:ext uri="{FF2B5EF4-FFF2-40B4-BE49-F238E27FC236}">
-                <a16:creationId xmlns:a16="http://schemas.microsoft.com/office/drawing/2014/main" id="{6CA547B2-4E7A-4F73-268F-23962F7C5A42}"/>
-              </a:ext>
-            </a:extLst>
-          </p:cNvPr>
-          <p:cNvSpPr/>
-          <p:nvPr/>
-        </p:nvSpPr>
-        <p:spPr>
-          <a:xfrm>
-            <a:off x="921481" y="2034153"/>
-            <a:ext cx="2243094" cy="273592"/>
-          </a:xfrm>
-          <a:prstGeom prst="rect">
-            <a:avLst/>
-          </a:prstGeom>
-        </p:spPr>
-        <p:style>
-          <a:lnRef idx="2">
-            <a:schemeClr val="accent1">
-              <a:shade val="15000"/>
-            </a:schemeClr>
-          </a:lnRef>
-          <a:fillRef idx="1">
-            <a:schemeClr val="accent1"/>
-          </a:fillRef>
-          <a:effectRef idx="0">
-            <a:schemeClr val="accent1"/>
-          </a:effectRef>
-          <a:fontRef idx="minor">
-            <a:schemeClr val="lt1"/>
-          </a:fontRef>
-        </p:style>
-        <p:txBody>
-          <a:bodyPr rtlCol="0" anchor="ctr"/>
-          <a:lstStyle/>
-          <a:p>
-            <a:pPr algn="ctr"/>
-            <a:r>
-              <a:rPr lang="en-US" sz="1400" dirty="0"/>
-              <a:t>Review/remove outliers</a:t>
-            </a:r>
-          </a:p>
-        </p:txBody>
-      </p:sp>
-      <p:sp>
-        <p:nvSpPr>
-          <p:cNvPr id="36" name="Rectangle 35">
-            <a:extLst>
-              <a:ext uri="{FF2B5EF4-FFF2-40B4-BE49-F238E27FC236}">
-                <a16:creationId xmlns:a16="http://schemas.microsoft.com/office/drawing/2014/main" id="{CE90DE05-9C47-3AE3-D69B-4CF4696CFF4F}"/>
-              </a:ext>
-            </a:extLst>
-          </p:cNvPr>
-          <p:cNvSpPr/>
-          <p:nvPr/>
-        </p:nvSpPr>
-        <p:spPr>
-          <a:xfrm>
-            <a:off x="921458" y="785501"/>
-            <a:ext cx="2243117" cy="274776"/>
-          </a:xfrm>
-          <a:prstGeom prst="rect">
-            <a:avLst/>
-          </a:prstGeom>
-          <a:solidFill>
-            <a:schemeClr val="accent4"/>
-          </a:solidFill>
-        </p:spPr>
-        <p:style>
-          <a:lnRef idx="2">
-            <a:schemeClr val="accent1">
-              <a:shade val="15000"/>
-            </a:schemeClr>
-          </a:lnRef>
-          <a:fillRef idx="1">
-            <a:schemeClr val="accent1"/>
-          </a:fillRef>
-          <a:effectRef idx="0">
-            <a:schemeClr val="accent1"/>
-          </a:effectRef>
-          <a:fontRef idx="minor">
-            <a:schemeClr val="lt1"/>
-          </a:fontRef>
-        </p:style>
-        <p:txBody>
-          <a:bodyPr rtlCol="0" anchor="ctr"/>
-          <a:lstStyle/>
-          <a:p>
-            <a:pPr algn="ctr"/>
-            <a:r>
-              <a:rPr lang="en-US" sz="1400" dirty="0"/>
-              <a:t>Contributed dataset</a:t>
             </a:r>
           </a:p>
         </p:txBody>
@@ -5241,11 +5342,11 @@
           <a:lstStyle/>
           <a:p>
             <a:r>
-              <a:rPr lang="en-US" sz="1200" b="1" dirty="0"/>
+              <a:rPr lang="en-US" sz="1150" b="1" dirty="0"/>
               <a:t>repeat</a:t>
             </a:r>
             <a:r>
-              <a:rPr lang="en-US" sz="1200" dirty="0"/>
+              <a:rPr lang="en-US" sz="1150" dirty="0"/>
               <a:t> - n x datasets</a:t>
             </a:r>
           </a:p>
@@ -5299,7 +5400,7 @@
           <a:p>
             <a:pPr algn="ctr"/>
             <a:r>
-              <a:rPr lang="en-US" sz="1400" dirty="0"/>
+              <a:rPr lang="en-US" sz="1150" dirty="0"/>
               <a:t>Multiple imputation</a:t>
             </a:r>
           </a:p>
@@ -5348,7 +5449,7 @@
           <a:p>
             <a:pPr algn="ctr"/>
             <a:r>
-              <a:rPr lang="en-US" sz="1400" dirty="0"/>
+              <a:rPr lang="en-US" sz="1150" dirty="0"/>
               <a:t>Variable selection</a:t>
             </a:r>
           </a:p>
@@ -5397,7 +5498,7 @@
           <a:p>
             <a:pPr algn="ctr"/>
             <a:r>
-              <a:rPr lang="en-US" sz="1400" dirty="0"/>
+              <a:rPr lang="en-US" sz="1150" dirty="0"/>
               <a:t>Model fitting</a:t>
             </a:r>
           </a:p>
@@ -5446,7 +5547,7 @@
           <a:p>
             <a:pPr algn="ctr"/>
             <a:r>
-              <a:rPr lang="en-US" sz="1400" dirty="0"/>
+              <a:rPr lang="en-US" sz="1150" dirty="0"/>
               <a:t>Estimate AP</a:t>
             </a:r>
           </a:p>
@@ -5500,7 +5601,7 @@
           <a:p>
             <a:pPr algn="ctr"/>
             <a:r>
-              <a:rPr lang="en-US" sz="1400" dirty="0"/>
+              <a:rPr lang="en-US" sz="1150" dirty="0"/>
               <a:t>Apply Rubin’s rules</a:t>
             </a:r>
           </a:p>
@@ -5547,55 +5648,6 @@
           </a:fontRef>
         </p:style>
       </p:cxnSp>
-      <p:sp>
-        <p:nvSpPr>
-          <p:cNvPr id="67" name="Down Arrow 66">
-            <a:extLst>
-              <a:ext uri="{FF2B5EF4-FFF2-40B4-BE49-F238E27FC236}">
-                <a16:creationId xmlns:a16="http://schemas.microsoft.com/office/drawing/2014/main" id="{BD30BB65-ED66-8452-E650-6299925A6542}"/>
-              </a:ext>
-            </a:extLst>
-          </p:cNvPr>
-          <p:cNvSpPr/>
-          <p:nvPr/>
-        </p:nvSpPr>
-        <p:spPr>
-          <a:xfrm>
-            <a:off x="3301139" y="781602"/>
-            <a:ext cx="135156" cy="1564886"/>
-          </a:xfrm>
-          <a:prstGeom prst="downArrow">
-            <a:avLst/>
-          </a:prstGeom>
-          <a:solidFill>
-            <a:schemeClr val="tx1"/>
-          </a:solidFill>
-        </p:spPr>
-        <p:style>
-          <a:lnRef idx="2">
-            <a:schemeClr val="accent1">
-              <a:shade val="15000"/>
-            </a:schemeClr>
-          </a:lnRef>
-          <a:fillRef idx="1">
-            <a:schemeClr val="accent1"/>
-          </a:fillRef>
-          <a:effectRef idx="0">
-            <a:schemeClr val="accent1"/>
-          </a:effectRef>
-          <a:fontRef idx="minor">
-            <a:schemeClr val="lt1"/>
-          </a:fontRef>
-        </p:style>
-        <p:txBody>
-          <a:bodyPr rtlCol="0" anchor="ctr"/>
-          <a:lstStyle/>
-          <a:p>
-            <a:pPr algn="ctr"/>
-            <a:endParaRPr lang="en-US" sz="1400"/>
-          </a:p>
-        </p:txBody>
-      </p:sp>
       <p:sp>
         <p:nvSpPr>
           <p:cNvPr id="68" name="Rectangle 67">
@@ -5644,7 +5696,7 @@
           <a:lstStyle/>
           <a:p>
             <a:pPr algn="ctr"/>
-            <a:endParaRPr lang="en-US" sz="1400"/>
+            <a:endParaRPr lang="en-US" sz="1150"/>
           </a:p>
         </p:txBody>
       </p:sp>
@@ -5696,7 +5748,7 @@
           <a:p>
             <a:pPr algn="ctr"/>
             <a:r>
-              <a:rPr lang="en-US" sz="1400" dirty="0"/>
+              <a:rPr lang="en-US" sz="1150" dirty="0"/>
               <a:t>Multiple imputation</a:t>
             </a:r>
           </a:p>
@@ -5745,7 +5797,7 @@
           <a:p>
             <a:pPr algn="ctr"/>
             <a:r>
-              <a:rPr lang="en-US" sz="1400" dirty="0"/>
+              <a:rPr lang="en-US" sz="1150" dirty="0"/>
               <a:t>Variable selection</a:t>
             </a:r>
           </a:p>
@@ -5794,7 +5846,7 @@
           <a:p>
             <a:pPr algn="ctr"/>
             <a:r>
-              <a:rPr lang="en-US" sz="1400" dirty="0"/>
+              <a:rPr lang="en-US" sz="1150" dirty="0"/>
               <a:t>Model fitting</a:t>
             </a:r>
           </a:p>
@@ -5884,7 +5936,7 @@
           <a:p>
             <a:pPr algn="ctr"/>
             <a:r>
-              <a:rPr lang="en-US" sz="1400" dirty="0"/>
+              <a:rPr lang="en-US" sz="1150" dirty="0"/>
               <a:t>Estimate AP</a:t>
             </a:r>
           </a:p>
@@ -5919,11 +5971,11 @@
           <a:lstStyle/>
           <a:p>
             <a:r>
-              <a:rPr lang="en-US" sz="1200" b="1" dirty="0"/>
+              <a:rPr lang="en-US" sz="1150" b="1" dirty="0"/>
               <a:t>repeat</a:t>
             </a:r>
             <a:r>
-              <a:rPr lang="en-US" sz="1200" dirty="0"/>
+              <a:rPr lang="en-US" sz="1150" dirty="0"/>
               <a:t> - m x imputations</a:t>
             </a:r>
           </a:p>
@@ -5958,11 +6010,11 @@
           <a:lstStyle/>
           <a:p>
             <a:r>
-              <a:rPr lang="en-US" sz="1200" b="1" dirty="0"/>
+              <a:rPr lang="en-US" sz="1150" b="1" dirty="0"/>
               <a:t>repeat</a:t>
             </a:r>
             <a:r>
-              <a:rPr lang="en-US" sz="1200" dirty="0"/>
+              <a:rPr lang="en-US" sz="1150" dirty="0"/>
               <a:t> - b x bootstrap samples</a:t>
             </a:r>
           </a:p>
@@ -6016,7 +6068,7 @@
           <a:p>
             <a:pPr algn="ctr"/>
             <a:r>
-              <a:rPr lang="en-US" sz="1400" dirty="0"/>
+              <a:rPr lang="en-US" sz="1150" dirty="0"/>
               <a:t>Apply Rubin’s rules</a:t>
             </a:r>
           </a:p>
@@ -6070,7 +6122,7 @@
           <a:p>
             <a:pPr algn="ctr"/>
             <a:r>
-              <a:rPr lang="en-US" sz="1400" dirty="0"/>
+              <a:rPr lang="en-US" sz="1150" dirty="0"/>
               <a:t>Original model</a:t>
             </a:r>
           </a:p>
@@ -6124,7 +6176,7 @@
           <a:p>
             <a:pPr algn="ctr"/>
             <a:r>
-              <a:rPr lang="en-US" sz="1400" dirty="0"/>
+              <a:rPr lang="en-US" sz="1150" dirty="0"/>
               <a:t>Bootstrap model</a:t>
             </a:r>
           </a:p>
@@ -6178,7 +6230,7 @@
           <a:lstStyle/>
           <a:p>
             <a:pPr algn="ctr"/>
-            <a:endParaRPr lang="en-US" sz="1400"/>
+            <a:endParaRPr lang="en-US" sz="1150"/>
           </a:p>
         </p:txBody>
       </p:sp>
@@ -6228,14 +6280,14 @@
           <a:p>
             <a:pPr algn="ctr"/>
             <a:r>
-              <a:rPr lang="en-US" sz="1400" dirty="0"/>
+              <a:rPr lang="en-US" sz="1150" dirty="0"/>
               <a:t>Evaluate BP </a:t>
             </a:r>
           </a:p>
           <a:p>
             <a:pPr algn="ctr"/>
             <a:r>
-              <a:rPr lang="en-US" sz="1400" dirty="0"/>
+              <a:rPr lang="en-US" sz="1150" dirty="0"/>
               <a:t>in original dataset</a:t>
             </a:r>
           </a:p>
@@ -6330,7 +6382,7 @@
           <a:p>
             <a:pPr algn="ctr"/>
             <a:r>
-              <a:rPr lang="en-US" sz="1400" dirty="0"/>
+              <a:rPr lang="en-US" sz="1150" dirty="0"/>
               <a:t>Apply Rubin’s rules</a:t>
             </a:r>
           </a:p>
@@ -6365,18 +6417,18 @@
           <a:lstStyle/>
           <a:p>
             <a:r>
-              <a:rPr lang="en-US" sz="1200" b="1" dirty="0"/>
+              <a:rPr lang="en-US" sz="1150" b="1" dirty="0"/>
               <a:t>repeat</a:t>
             </a:r>
             <a:r>
-              <a:rPr lang="en-US" sz="1200" dirty="0"/>
+              <a:rPr lang="en-US" sz="1150" dirty="0"/>
               <a:t> – </a:t>
             </a:r>
           </a:p>
           <a:p>
             <a:pPr algn="ctr"/>
             <a:r>
-              <a:rPr lang="en-US" sz="1200" dirty="0"/>
+              <a:rPr lang="en-US" sz="1150" dirty="0"/>
               <a:t>m x imputations</a:t>
             </a:r>
           </a:p>
@@ -6427,7 +6479,7 @@
           <a:lstStyle/>
           <a:p>
             <a:pPr algn="ctr"/>
-            <a:endParaRPr lang="en-US" sz="1400"/>
+            <a:endParaRPr lang="en-US" sz="1150"/>
           </a:p>
         </p:txBody>
       </p:sp>
@@ -6476,7 +6528,7 @@
           <a:lstStyle/>
           <a:p>
             <a:pPr algn="ctr"/>
-            <a:endParaRPr lang="en-US" sz="1400"/>
+            <a:endParaRPr lang="en-US" sz="1150"/>
           </a:p>
         </p:txBody>
       </p:sp>
@@ -6523,7 +6575,7 @@
           <a:p>
             <a:pPr algn="ctr"/>
             <a:r>
-              <a:rPr lang="en-US" sz="1400" dirty="0"/>
+              <a:rPr lang="en-US" sz="1150" dirty="0"/>
               <a:t>Estimate optimism</a:t>
             </a:r>
           </a:p>
@@ -6572,7 +6624,7 @@
           <a:p>
             <a:pPr algn="ctr"/>
             <a:r>
-              <a:rPr lang="en-US" sz="1400" dirty="0"/>
+              <a:rPr lang="en-US" sz="1150" dirty="0"/>
               <a:t>Estimate average optimism</a:t>
             </a:r>
           </a:p>
@@ -6626,7 +6678,7 @@
           <a:p>
             <a:pPr algn="ctr"/>
             <a:r>
-              <a:rPr lang="en-US" sz="1400" dirty="0"/>
+              <a:rPr lang="en-US" sz="1150" dirty="0"/>
               <a:t>Optimism adjusted model</a:t>
             </a:r>
           </a:p>
@@ -6675,7 +6727,7 @@
           <a:p>
             <a:pPr algn="ctr"/>
             <a:r>
-              <a:rPr lang="en-US" sz="1400" dirty="0"/>
+              <a:rPr lang="en-US" sz="1150" dirty="0"/>
               <a:t>Adjust coefficients and performance for optimism</a:t>
             </a:r>
           </a:p>
@@ -6697,12 +6749,12 @@
         </p:nvCxnSpPr>
         <p:spPr>
           <a:xfrm flipV="1">
-            <a:off x="3494574" y="537663"/>
-            <a:ext cx="5995117" cy="2273248"/>
+            <a:off x="3494575" y="537663"/>
+            <a:ext cx="5995116" cy="2603463"/>
           </a:xfrm>
           <a:prstGeom prst="bentConnector3">
             <a:avLst>
-              <a:gd name="adj1" fmla="val 12632"/>
+              <a:gd name="adj1" fmla="val 12716"/>
             </a:avLst>
           </a:prstGeom>
         </p:spPr>
@@ -6764,7 +6816,7 @@
           <a:p>
             <a:pPr algn="ctr"/>
             <a:r>
-              <a:rPr lang="en-US" sz="1400" dirty="0"/>
+              <a:rPr lang="en-US" sz="1150" dirty="0"/>
               <a:t>Review model stability</a:t>
             </a:r>
           </a:p>
@@ -6784,7 +6836,7 @@
         </p:nvSpPr>
         <p:spPr>
           <a:xfrm rot="10800000">
-            <a:off x="2181606" y="2532620"/>
+            <a:off x="2206321" y="2812833"/>
             <a:ext cx="45719" cy="55386"/>
           </a:xfrm>
           <a:prstGeom prst="triangle">
@@ -6820,7 +6872,7 @@
           <a:lstStyle/>
           <a:p>
             <a:pPr algn="ctr"/>
-            <a:endParaRPr lang="en-US">
+            <a:endParaRPr lang="en-US" sz="1150">
               <a:solidFill>
                 <a:schemeClr val="accent1"/>
               </a:solidFill>
@@ -6878,7 +6930,7 @@
           <a:lstStyle/>
           <a:p>
             <a:pPr algn="ctr"/>
-            <a:endParaRPr lang="en-US">
+            <a:endParaRPr lang="en-US" sz="1150">
               <a:solidFill>
                 <a:schemeClr val="accent1"/>
               </a:solidFill>
@@ -6936,7 +6988,7 @@
           <a:lstStyle/>
           <a:p>
             <a:pPr algn="ctr"/>
-            <a:endParaRPr lang="en-US">
+            <a:endParaRPr lang="en-US" sz="1150">
               <a:solidFill>
                 <a:schemeClr val="accent1"/>
               </a:solidFill>
@@ -6994,7 +7046,7 @@
           <a:lstStyle/>
           <a:p>
             <a:pPr algn="ctr"/>
-            <a:endParaRPr lang="en-US">
+            <a:endParaRPr lang="en-US" sz="1150">
               <a:solidFill>
                 <a:schemeClr val="accent1"/>
               </a:solidFill>
@@ -7052,7 +7104,7 @@
           <a:lstStyle/>
           <a:p>
             <a:pPr algn="ctr"/>
-            <a:endParaRPr lang="en-US">
+            <a:endParaRPr lang="en-US" sz="1150">
               <a:solidFill>
                 <a:schemeClr val="accent1"/>
               </a:solidFill>
@@ -7110,7 +7162,7 @@
           <a:lstStyle/>
           <a:p>
             <a:pPr algn="ctr"/>
-            <a:endParaRPr lang="en-US">
+            <a:endParaRPr lang="en-US" sz="1150">
               <a:solidFill>
                 <a:schemeClr val="accent1"/>
               </a:solidFill>
@@ -7168,7 +7220,7 @@
           <a:lstStyle/>
           <a:p>
             <a:pPr algn="ctr"/>
-            <a:endParaRPr lang="en-US">
+            <a:endParaRPr lang="en-US" sz="1150">
               <a:solidFill>
                 <a:schemeClr val="accent1"/>
               </a:solidFill>
@@ -7226,7 +7278,7 @@
           <a:lstStyle/>
           <a:p>
             <a:pPr algn="ctr"/>
-            <a:endParaRPr lang="en-US">
+            <a:endParaRPr lang="en-US" sz="1150">
               <a:solidFill>
                 <a:schemeClr val="accent1"/>
               </a:solidFill>
@@ -7284,7 +7336,7 @@
           <a:lstStyle/>
           <a:p>
             <a:pPr algn="ctr"/>
-            <a:endParaRPr lang="en-US">
+            <a:endParaRPr lang="en-US" sz="1150">
               <a:solidFill>
                 <a:schemeClr val="accent1"/>
               </a:solidFill>
@@ -7342,7 +7394,7 @@
           <a:lstStyle/>
           <a:p>
             <a:pPr algn="ctr"/>
-            <a:endParaRPr lang="en-US">
+            <a:endParaRPr lang="en-US" sz="1150">
               <a:solidFill>
                 <a:schemeClr val="accent1"/>
               </a:solidFill>
@@ -7400,7 +7452,7 @@
           <a:lstStyle/>
           <a:p>
             <a:pPr algn="ctr"/>
-            <a:endParaRPr lang="en-US">
+            <a:endParaRPr lang="en-US" sz="1150">
               <a:solidFill>
                 <a:schemeClr val="accent1"/>
               </a:solidFill>
@@ -7458,7 +7510,7 @@
           <a:lstStyle/>
           <a:p>
             <a:pPr algn="ctr"/>
-            <a:endParaRPr lang="en-US">
+            <a:endParaRPr lang="en-US" sz="1150">
               <a:solidFill>
                 <a:schemeClr val="accent1"/>
               </a:solidFill>
@@ -7516,7 +7568,7 @@
           <a:lstStyle/>
           <a:p>
             <a:pPr algn="ctr"/>
-            <a:endParaRPr lang="en-US">
+            <a:endParaRPr lang="en-US" sz="1150">
               <a:solidFill>
                 <a:schemeClr val="accent1"/>
               </a:solidFill>
@@ -7574,7 +7626,7 @@
           <a:lstStyle/>
           <a:p>
             <a:pPr algn="ctr"/>
-            <a:endParaRPr lang="en-US">
+            <a:endParaRPr lang="en-US" sz="1150">
               <a:solidFill>
                 <a:schemeClr val="accent1"/>
               </a:solidFill>
@@ -7616,11 +7668,11 @@
           <a:lstStyle/>
           <a:p>
             <a:r>
-              <a:rPr lang="en-US" sz="1200" b="1" dirty="0"/>
+              <a:rPr lang="en-US" sz="1150" b="1" dirty="0"/>
               <a:t>repeat</a:t>
             </a:r>
             <a:r>
-              <a:rPr lang="en-US" sz="1200" dirty="0"/>
+              <a:rPr lang="en-US" sz="1150" dirty="0"/>
               <a:t> - m x imputations</a:t>
             </a:r>
           </a:p>
@@ -7676,7 +7728,7 @@
           <a:lstStyle/>
           <a:p>
             <a:pPr algn="ctr"/>
-            <a:endParaRPr lang="en-US">
+            <a:endParaRPr lang="en-US" sz="1150">
               <a:solidFill>
                 <a:schemeClr val="accent1"/>
               </a:solidFill>
@@ -7698,7 +7750,7 @@
         </p:nvSpPr>
         <p:spPr>
           <a:xfrm>
-            <a:off x="835253" y="2636133"/>
+            <a:off x="835253" y="2952225"/>
             <a:ext cx="366936" cy="366936"/>
           </a:xfrm>
           <a:prstGeom prst="ellipse">
@@ -7728,7 +7780,7 @@
           <a:p>
             <a:pPr algn="ctr"/>
             <a:r>
-              <a:rPr lang="en-US" sz="2800" dirty="0">
+              <a:rPr lang="en-US" sz="1600" dirty="0">
                 <a:ln w="0"/>
                 <a:solidFill>
                   <a:schemeClr val="tx1"/>
@@ -7790,7 +7842,7 @@
           <a:p>
             <a:pPr algn="ctr"/>
             <a:r>
-              <a:rPr lang="en-US" sz="2800" dirty="0">
+              <a:rPr lang="en-US" sz="1600" dirty="0">
                 <a:ln w="0"/>
                 <a:solidFill>
                   <a:schemeClr val="tx1"/>
@@ -7852,7 +7904,7 @@
           <a:p>
             <a:pPr algn="ctr"/>
             <a:r>
-              <a:rPr lang="en-US" sz="2800" dirty="0">
+              <a:rPr lang="en-US" sz="1600" dirty="0">
                 <a:ln w="0"/>
                 <a:solidFill>
                   <a:schemeClr val="tx1"/>
@@ -7884,7 +7936,7 @@
         </p:nvSpPr>
         <p:spPr>
           <a:xfrm>
-            <a:off x="1099040" y="4745286"/>
+            <a:off x="1336109" y="4779153"/>
             <a:ext cx="2566673" cy="487509"/>
           </a:xfrm>
           <a:custGeom>
@@ -8170,7 +8222,7 @@
           <a:lstStyle/>
           <a:p>
             <a:pPr algn="ctr"/>
-            <a:endParaRPr lang="en-US"/>
+            <a:endParaRPr lang="en-US" sz="1600"/>
           </a:p>
         </p:txBody>
       </p:sp>
@@ -8188,7 +8240,7 @@
         </p:nvSpPr>
         <p:spPr>
           <a:xfrm>
-            <a:off x="1225806" y="4854122"/>
+            <a:off x="1462875" y="4887989"/>
             <a:ext cx="291051" cy="281482"/>
           </a:xfrm>
           <a:prstGeom prst="ellipse">
@@ -8218,7 +8270,7 @@
           <a:p>
             <a:pPr algn="ctr"/>
             <a:r>
-              <a:rPr lang="en-US" sz="2000" dirty="0">
+              <a:rPr lang="en-US" sz="1600" dirty="0">
                 <a:ln w="0"/>
                 <a:solidFill>
                   <a:schemeClr val="tx1"/>
@@ -8250,7 +8302,7 @@
         </p:nvSpPr>
         <p:spPr>
           <a:xfrm>
-            <a:off x="1087947" y="5306641"/>
+            <a:off x="1325016" y="5340508"/>
             <a:ext cx="2577766" cy="487509"/>
           </a:xfrm>
           <a:custGeom>
@@ -8536,7 +8588,7 @@
           <a:lstStyle/>
           <a:p>
             <a:pPr algn="ctr"/>
-            <a:endParaRPr lang="en-US"/>
+            <a:endParaRPr lang="en-US" sz="1600"/>
           </a:p>
         </p:txBody>
       </p:sp>
@@ -8554,7 +8606,7 @@
         </p:nvSpPr>
         <p:spPr>
           <a:xfrm>
-            <a:off x="1087948" y="5888334"/>
+            <a:off x="1325017" y="5922201"/>
             <a:ext cx="2577766" cy="487509"/>
           </a:xfrm>
           <a:custGeom>
@@ -8837,7 +8889,7 @@
           <a:lstStyle/>
           <a:p>
             <a:pPr algn="ctr"/>
-            <a:endParaRPr lang="en-US"/>
+            <a:endParaRPr lang="en-US" sz="1600"/>
           </a:p>
         </p:txBody>
       </p:sp>
@@ -8855,8 +8907,8 @@
         </p:nvSpPr>
         <p:spPr>
           <a:xfrm>
-            <a:off x="1567381" y="4811270"/>
-            <a:ext cx="2026936" cy="338554"/>
+            <a:off x="1804450" y="4888001"/>
+            <a:ext cx="2026936" cy="307777"/>
           </a:xfrm>
           <a:prstGeom prst="rect">
             <a:avLst/>
@@ -8870,7 +8922,7 @@
           <a:lstStyle/>
           <a:p>
             <a:r>
-              <a:rPr lang="en-US" sz="1600" dirty="0">
+              <a:rPr lang="en-US" sz="1400" dirty="0">
                 <a:ln w="0"/>
                 <a:effectLst>
                   <a:outerShdw blurRad="38100" dist="19050" dir="2700000" algn="tl" rotWithShape="0">
@@ -8883,7 +8935,7 @@
               <a:t>Data </a:t>
             </a:r>
             <a:r>
-              <a:rPr lang="en-US" sz="1600" dirty="0" err="1">
+              <a:rPr lang="en-US" sz="1400" dirty="0" err="1">
                 <a:ln w="0"/>
                 <a:effectLst>
                   <a:outerShdw blurRad="38100" dist="19050" dir="2700000" algn="tl" rotWithShape="0">
@@ -8895,7 +8947,7 @@
               </a:rPr>
               <a:t>harmonisation</a:t>
             </a:r>
-            <a:endParaRPr lang="en-US" sz="1600" dirty="0">
+            <a:endParaRPr lang="en-US" sz="1400" dirty="0">
               <a:ln w="0"/>
               <a:solidFill>
                 <a:schemeClr val="tx1"/>
@@ -8925,8 +8977,8 @@
         </p:nvSpPr>
         <p:spPr>
           <a:xfrm>
-            <a:off x="1567381" y="5366322"/>
-            <a:ext cx="2064134" cy="338554"/>
+            <a:off x="1804450" y="5443053"/>
+            <a:ext cx="2064134" cy="307777"/>
           </a:xfrm>
           <a:prstGeom prst="rect">
             <a:avLst/>
@@ -8940,7 +8992,7 @@
           <a:lstStyle/>
           <a:p>
             <a:r>
-              <a:rPr lang="en-US" sz="1600" dirty="0">
+              <a:rPr lang="en-US" sz="1400" dirty="0">
                 <a:ln w="0"/>
                 <a:effectLst>
                   <a:outerShdw blurRad="38100" dist="19050" dir="2700000" algn="tl" rotWithShape="0">
@@ -8952,7 +9004,7 @@
               </a:rPr>
               <a:t>Model development</a:t>
             </a:r>
-            <a:endParaRPr lang="en-US" sz="1600" dirty="0">
+            <a:endParaRPr lang="en-US" sz="1400" dirty="0">
               <a:ln w="0"/>
               <a:solidFill>
                 <a:schemeClr val="tx1"/>
@@ -8982,8 +9034,8 @@
         </p:nvSpPr>
         <p:spPr>
           <a:xfrm>
-            <a:off x="1580868" y="5962811"/>
-            <a:ext cx="2215489" cy="338554"/>
+            <a:off x="1817937" y="6039542"/>
+            <a:ext cx="2215489" cy="307777"/>
           </a:xfrm>
           <a:prstGeom prst="rect">
             <a:avLst/>
@@ -8997,7 +9049,7 @@
           <a:lstStyle/>
           <a:p>
             <a:r>
-              <a:rPr lang="en-US" sz="1600" dirty="0">
+              <a:rPr lang="en-US" sz="1400" dirty="0">
                 <a:ln w="0"/>
                 <a:effectLst>
                   <a:outerShdw blurRad="38100" dist="19050" dir="2700000" algn="tl" rotWithShape="0">
@@ -9009,7 +9061,7 @@
               </a:rPr>
               <a:t>Internal validation</a:t>
             </a:r>
-            <a:endParaRPr lang="en-US" sz="1600" dirty="0">
+            <a:endParaRPr lang="en-US" sz="1400" dirty="0">
               <a:ln w="0"/>
               <a:solidFill>
                 <a:schemeClr val="tx1"/>
@@ -9039,7 +9091,7 @@
         </p:nvSpPr>
         <p:spPr>
           <a:xfrm>
-            <a:off x="839253" y="4961044"/>
+            <a:off x="1076322" y="4994911"/>
             <a:ext cx="126248" cy="1265265"/>
           </a:xfrm>
           <a:prstGeom prst="downArrow">
@@ -9070,7 +9122,7 @@
           <a:lstStyle/>
           <a:p>
             <a:pPr algn="ctr"/>
-            <a:endParaRPr lang="en-US" sz="1400"/>
+            <a:endParaRPr lang="en-US" sz="1150"/>
           </a:p>
         </p:txBody>
       </p:sp>
@@ -9088,7 +9140,7 @@
         </p:nvSpPr>
         <p:spPr>
           <a:xfrm>
-            <a:off x="788561" y="3615997"/>
+            <a:off x="1025630" y="3649864"/>
             <a:ext cx="2988774" cy="452421"/>
           </a:xfrm>
           <a:prstGeom prst="rect">
@@ -9122,7 +9174,7 @@
           <a:lstStyle/>
           <a:p>
             <a:r>
-              <a:rPr lang="en-US" sz="1200" dirty="0">
+              <a:rPr lang="en-US" sz="1150" dirty="0">
                 <a:solidFill>
                   <a:schemeClr val="tx1"/>
                 </a:solidFill>
@@ -9146,7 +9198,7 @@
         </p:nvSpPr>
         <p:spPr>
           <a:xfrm>
-            <a:off x="780626" y="4148677"/>
+            <a:off x="1017695" y="4182544"/>
             <a:ext cx="2988774" cy="452421"/>
           </a:xfrm>
           <a:prstGeom prst="rect">
@@ -9177,7 +9229,7 @@
           <a:lstStyle/>
           <a:p>
             <a:r>
-              <a:rPr lang="en-US" sz="1200" dirty="0">
+              <a:rPr lang="en-US" sz="1150" dirty="0">
                 <a:solidFill>
                   <a:schemeClr val="tx1"/>
                 </a:solidFill>
@@ -9201,7 +9253,7 @@
         </p:nvSpPr>
         <p:spPr>
           <a:xfrm>
-            <a:off x="1529766" y="2668249"/>
+            <a:off x="1529766" y="2984341"/>
             <a:ext cx="2171202" cy="309530"/>
           </a:xfrm>
           <a:prstGeom prst="rect">
@@ -9233,7 +9285,7 @@
           <a:p>
             <a:pPr algn="ctr"/>
             <a:r>
-              <a:rPr lang="en-US" sz="1400" dirty="0"/>
+              <a:rPr lang="en-US" sz="1150" dirty="0"/>
               <a:t>Merged dataset</a:t>
             </a:r>
           </a:p>
@@ -9253,7 +9305,7 @@
         </p:nvSpPr>
         <p:spPr>
           <a:xfrm>
-            <a:off x="1226022" y="5398812"/>
+            <a:off x="1463091" y="5432679"/>
             <a:ext cx="291051" cy="281482"/>
           </a:xfrm>
           <a:prstGeom prst="ellipse">
@@ -9283,7 +9335,7 @@
           <a:p>
             <a:pPr algn="ctr"/>
             <a:r>
-              <a:rPr lang="en-US" sz="2000" dirty="0">
+              <a:rPr lang="en-US" sz="1600" dirty="0">
                 <a:ln w="0"/>
                 <a:solidFill>
                   <a:schemeClr val="tx1"/>
@@ -9315,7 +9367,7 @@
         </p:nvSpPr>
         <p:spPr>
           <a:xfrm>
-            <a:off x="1223518" y="5973212"/>
+            <a:off x="1460587" y="6007079"/>
             <a:ext cx="291051" cy="281482"/>
           </a:xfrm>
           <a:prstGeom prst="ellipse">
@@ -9345,7 +9397,7 @@
           <a:p>
             <a:pPr algn="ctr"/>
             <a:r>
-              <a:rPr lang="en-US" sz="2000" dirty="0">
+              <a:rPr lang="en-US" sz="1600" dirty="0">
                 <a:ln w="0"/>
                 <a:solidFill>
                   <a:schemeClr val="tx1"/>
@@ -9377,8 +9429,8 @@
         </p:nvSpPr>
         <p:spPr>
           <a:xfrm>
-            <a:off x="727000" y="3311505"/>
-            <a:ext cx="460062" cy="307777"/>
+            <a:off x="592959" y="3657903"/>
+            <a:ext cx="429926" cy="269304"/>
           </a:xfrm>
           <a:prstGeom prst="rect">
             <a:avLst/>
@@ -9392,8 +9444,357 @@
           <a:lstStyle/>
           <a:p>
             <a:r>
-              <a:rPr lang="en-US" sz="1400" dirty="0"/>
+              <a:rPr lang="en-US" sz="1150" b="1" dirty="0"/>
               <a:t>Key</a:t>
+            </a:r>
+          </a:p>
+        </p:txBody>
+      </p:sp>
+      <p:sp>
+        <p:nvSpPr>
+          <p:cNvPr id="35" name="Rectangle 34">
+            <a:extLst>
+              <a:ext uri="{FF2B5EF4-FFF2-40B4-BE49-F238E27FC236}">
+                <a16:creationId xmlns:a16="http://schemas.microsoft.com/office/drawing/2014/main" id="{8CA22693-1AA5-1B6D-2BF6-33D33D7F17DE}"/>
+              </a:ext>
+            </a:extLst>
+          </p:cNvPr>
+          <p:cNvSpPr/>
+          <p:nvPr/>
+        </p:nvSpPr>
+        <p:spPr>
+          <a:xfrm>
+            <a:off x="819457" y="645922"/>
+            <a:ext cx="2794189" cy="2087532"/>
+          </a:xfrm>
+          <a:prstGeom prst="rect">
+            <a:avLst/>
+          </a:prstGeom>
+          <a:solidFill>
+            <a:schemeClr val="tx2">
+              <a:lumMod val="10000"/>
+              <a:lumOff val="90000"/>
+            </a:schemeClr>
+          </a:solidFill>
+        </p:spPr>
+        <p:style>
+          <a:lnRef idx="2">
+            <a:schemeClr val="accent1">
+              <a:shade val="15000"/>
+            </a:schemeClr>
+          </a:lnRef>
+          <a:fillRef idx="1">
+            <a:schemeClr val="accent1"/>
+          </a:fillRef>
+          <a:effectRef idx="0">
+            <a:schemeClr val="accent1"/>
+          </a:effectRef>
+          <a:fontRef idx="minor">
+            <a:schemeClr val="lt1"/>
+          </a:fontRef>
+        </p:style>
+        <p:txBody>
+          <a:bodyPr rtlCol="0" anchor="ctr"/>
+          <a:lstStyle/>
+          <a:p>
+            <a:pPr algn="ctr"/>
+            <a:endParaRPr lang="en-US" sz="1150"/>
+          </a:p>
+        </p:txBody>
+      </p:sp>
+      <p:sp>
+        <p:nvSpPr>
+          <p:cNvPr id="11" name="Rectangle 10">
+            <a:extLst>
+              <a:ext uri="{FF2B5EF4-FFF2-40B4-BE49-F238E27FC236}">
+                <a16:creationId xmlns:a16="http://schemas.microsoft.com/office/drawing/2014/main" id="{87478BF3-2D43-FD80-7E4D-584FC79AFA1E}"/>
+              </a:ext>
+            </a:extLst>
+          </p:cNvPr>
+          <p:cNvSpPr/>
+          <p:nvPr/>
+        </p:nvSpPr>
+        <p:spPr>
+          <a:xfrm>
+            <a:off x="921458" y="1161785"/>
+            <a:ext cx="2243117" cy="274776"/>
+          </a:xfrm>
+          <a:prstGeom prst="rect">
+            <a:avLst/>
+          </a:prstGeom>
+        </p:spPr>
+        <p:style>
+          <a:lnRef idx="2">
+            <a:schemeClr val="accent1">
+              <a:shade val="15000"/>
+            </a:schemeClr>
+          </a:lnRef>
+          <a:fillRef idx="1">
+            <a:schemeClr val="accent1"/>
+          </a:fillRef>
+          <a:effectRef idx="0">
+            <a:schemeClr val="accent1"/>
+          </a:effectRef>
+          <a:fontRef idx="minor">
+            <a:schemeClr val="lt1"/>
+          </a:fontRef>
+        </p:style>
+        <p:txBody>
+          <a:bodyPr rtlCol="0" anchor="ctr"/>
+          <a:lstStyle/>
+          <a:p>
+            <a:pPr algn="ctr"/>
+            <a:r>
+              <a:rPr lang="en-US" sz="1150" dirty="0"/>
+              <a:t>Curate to CDISC standard</a:t>
+            </a:r>
+          </a:p>
+        </p:txBody>
+      </p:sp>
+      <p:sp>
+        <p:nvSpPr>
+          <p:cNvPr id="12" name="Rectangle 11">
+            <a:extLst>
+              <a:ext uri="{FF2B5EF4-FFF2-40B4-BE49-F238E27FC236}">
+                <a16:creationId xmlns:a16="http://schemas.microsoft.com/office/drawing/2014/main" id="{1DF9767B-DDA3-30B6-4588-DE8B4ED86D54}"/>
+              </a:ext>
+            </a:extLst>
+          </p:cNvPr>
+          <p:cNvSpPr/>
+          <p:nvPr/>
+        </p:nvSpPr>
+        <p:spPr>
+          <a:xfrm>
+            <a:off x="926008" y="1946069"/>
+            <a:ext cx="2243104" cy="273592"/>
+          </a:xfrm>
+          <a:prstGeom prst="rect">
+            <a:avLst/>
+          </a:prstGeom>
+        </p:spPr>
+        <p:style>
+          <a:lnRef idx="2">
+            <a:schemeClr val="accent1">
+              <a:shade val="15000"/>
+            </a:schemeClr>
+          </a:lnRef>
+          <a:fillRef idx="1">
+            <a:schemeClr val="accent1"/>
+          </a:fillRef>
+          <a:effectRef idx="0">
+            <a:schemeClr val="accent1"/>
+          </a:effectRef>
+          <a:fontRef idx="minor">
+            <a:schemeClr val="lt1"/>
+          </a:fontRef>
+        </p:style>
+        <p:txBody>
+          <a:bodyPr rtlCol="0" anchor="ctr"/>
+          <a:lstStyle/>
+          <a:p>
+            <a:pPr algn="ctr"/>
+            <a:r>
+              <a:rPr lang="en-US" sz="1150" dirty="0"/>
+              <a:t>Apply eligibility criteria</a:t>
+            </a:r>
+          </a:p>
+        </p:txBody>
+      </p:sp>
+      <p:sp>
+        <p:nvSpPr>
+          <p:cNvPr id="32" name="Rectangle 31">
+            <a:extLst>
+              <a:ext uri="{FF2B5EF4-FFF2-40B4-BE49-F238E27FC236}">
+                <a16:creationId xmlns:a16="http://schemas.microsoft.com/office/drawing/2014/main" id="{6CA547B2-4E7A-4F73-268F-23962F7C5A42}"/>
+              </a:ext>
+            </a:extLst>
+          </p:cNvPr>
+          <p:cNvSpPr/>
+          <p:nvPr/>
+        </p:nvSpPr>
+        <p:spPr>
+          <a:xfrm>
+            <a:off x="921481" y="2343537"/>
+            <a:ext cx="2243094" cy="273592"/>
+          </a:xfrm>
+          <a:prstGeom prst="rect">
+            <a:avLst/>
+          </a:prstGeom>
+        </p:spPr>
+        <p:style>
+          <a:lnRef idx="2">
+            <a:schemeClr val="accent1">
+              <a:shade val="15000"/>
+            </a:schemeClr>
+          </a:lnRef>
+          <a:fillRef idx="1">
+            <a:schemeClr val="accent1"/>
+          </a:fillRef>
+          <a:effectRef idx="0">
+            <a:schemeClr val="accent1"/>
+          </a:effectRef>
+          <a:fontRef idx="minor">
+            <a:schemeClr val="lt1"/>
+          </a:fontRef>
+        </p:style>
+        <p:txBody>
+          <a:bodyPr rtlCol="0" anchor="ctr"/>
+          <a:lstStyle/>
+          <a:p>
+            <a:pPr algn="ctr"/>
+            <a:r>
+              <a:rPr lang="en-US" sz="1150" dirty="0"/>
+              <a:t>Review/remove outliers</a:t>
+            </a:r>
+          </a:p>
+        </p:txBody>
+      </p:sp>
+      <p:sp>
+        <p:nvSpPr>
+          <p:cNvPr id="36" name="Rectangle 35">
+            <a:extLst>
+              <a:ext uri="{FF2B5EF4-FFF2-40B4-BE49-F238E27FC236}">
+                <a16:creationId xmlns:a16="http://schemas.microsoft.com/office/drawing/2014/main" id="{CE90DE05-9C47-3AE3-D69B-4CF4696CFF4F}"/>
+              </a:ext>
+            </a:extLst>
+          </p:cNvPr>
+          <p:cNvSpPr/>
+          <p:nvPr/>
+        </p:nvSpPr>
+        <p:spPr>
+          <a:xfrm>
+            <a:off x="921458" y="771751"/>
+            <a:ext cx="2243117" cy="274776"/>
+          </a:xfrm>
+          <a:prstGeom prst="rect">
+            <a:avLst/>
+          </a:prstGeom>
+          <a:solidFill>
+            <a:schemeClr val="accent4"/>
+          </a:solidFill>
+        </p:spPr>
+        <p:style>
+          <a:lnRef idx="2">
+            <a:schemeClr val="accent1">
+              <a:shade val="15000"/>
+            </a:schemeClr>
+          </a:lnRef>
+          <a:fillRef idx="1">
+            <a:schemeClr val="accent1"/>
+          </a:fillRef>
+          <a:effectRef idx="0">
+            <a:schemeClr val="accent1"/>
+          </a:effectRef>
+          <a:fontRef idx="minor">
+            <a:schemeClr val="lt1"/>
+          </a:fontRef>
+        </p:style>
+        <p:txBody>
+          <a:bodyPr rtlCol="0" anchor="ctr"/>
+          <a:lstStyle/>
+          <a:p>
+            <a:pPr algn="ctr"/>
+            <a:r>
+              <a:rPr lang="en-US" sz="1150" dirty="0"/>
+              <a:t>Contributed dataset</a:t>
+            </a:r>
+          </a:p>
+        </p:txBody>
+      </p:sp>
+      <p:sp>
+        <p:nvSpPr>
+          <p:cNvPr id="67" name="Down Arrow 66">
+            <a:extLst>
+              <a:ext uri="{FF2B5EF4-FFF2-40B4-BE49-F238E27FC236}">
+                <a16:creationId xmlns:a16="http://schemas.microsoft.com/office/drawing/2014/main" id="{BD30BB65-ED66-8452-E650-6299925A6542}"/>
+              </a:ext>
+            </a:extLst>
+          </p:cNvPr>
+          <p:cNvSpPr/>
+          <p:nvPr/>
+        </p:nvSpPr>
+        <p:spPr>
+          <a:xfrm>
+            <a:off x="3301139" y="898479"/>
+            <a:ext cx="135156" cy="1564886"/>
+          </a:xfrm>
+          <a:prstGeom prst="downArrow">
+            <a:avLst/>
+          </a:prstGeom>
+          <a:solidFill>
+            <a:schemeClr val="tx1"/>
+          </a:solidFill>
+        </p:spPr>
+        <p:style>
+          <a:lnRef idx="2">
+            <a:schemeClr val="accent1">
+              <a:shade val="15000"/>
+            </a:schemeClr>
+          </a:lnRef>
+          <a:fillRef idx="1">
+            <a:schemeClr val="accent1"/>
+          </a:fillRef>
+          <a:effectRef idx="0">
+            <a:schemeClr val="accent1"/>
+          </a:effectRef>
+          <a:fontRef idx="minor">
+            <a:schemeClr val="lt1"/>
+          </a:fontRef>
+        </p:style>
+        <p:txBody>
+          <a:bodyPr rtlCol="0" anchor="ctr"/>
+          <a:lstStyle/>
+          <a:p>
+            <a:pPr algn="ctr"/>
+            <a:endParaRPr lang="en-US" sz="1150"/>
+          </a:p>
+        </p:txBody>
+      </p:sp>
+      <p:sp>
+        <p:nvSpPr>
+          <p:cNvPr id="4" name="Rectangle 3">
+            <a:extLst>
+              <a:ext uri="{FF2B5EF4-FFF2-40B4-BE49-F238E27FC236}">
+                <a16:creationId xmlns:a16="http://schemas.microsoft.com/office/drawing/2014/main" id="{AFE569A2-8C90-9375-66B5-540754033EE0}"/>
+              </a:ext>
+            </a:extLst>
+          </p:cNvPr>
+          <p:cNvSpPr/>
+          <p:nvPr/>
+        </p:nvSpPr>
+        <p:spPr>
+          <a:xfrm>
+            <a:off x="918902" y="1553268"/>
+            <a:ext cx="2243104" cy="273592"/>
+          </a:xfrm>
+          <a:prstGeom prst="rect">
+            <a:avLst/>
+          </a:prstGeom>
+        </p:spPr>
+        <p:style>
+          <a:lnRef idx="2">
+            <a:schemeClr val="accent1">
+              <a:shade val="15000"/>
+            </a:schemeClr>
+          </a:lnRef>
+          <a:fillRef idx="1">
+            <a:schemeClr val="accent1"/>
+          </a:fillRef>
+          <a:effectRef idx="0">
+            <a:schemeClr val="accent1"/>
+          </a:effectRef>
+          <a:fontRef idx="minor">
+            <a:schemeClr val="lt1"/>
+          </a:fontRef>
+        </p:style>
+        <p:txBody>
+          <a:bodyPr rtlCol="0" anchor="ctr"/>
+          <a:lstStyle/>
+          <a:p>
+            <a:pPr algn="ctr"/>
+            <a:r>
+              <a:rPr lang="en-US" sz="1150" dirty="0"/>
+              <a:t>Convert to analysis standard</a:t>
             </a:r>
           </a:p>
         </p:txBody>

</xml_diff>